<commit_message>
Se añade modificación presentación
</commit_message>
<xml_diff>
--- a/documentos/Presentación3.pptx
+++ b/documentos/Presentación3.pptx
@@ -6,12 +6,18 @@
   </p:sldMasterIdLst>
   <p:sldIdLst>
     <p:sldId id="256" r:id="rId2"/>
-    <p:sldId id="262" r:id="rId3"/>
-    <p:sldId id="258" r:id="rId4"/>
-    <p:sldId id="259" r:id="rId5"/>
-    <p:sldId id="260" r:id="rId6"/>
-    <p:sldId id="263" r:id="rId7"/>
-    <p:sldId id="264" r:id="rId8"/>
+    <p:sldId id="265" r:id="rId3"/>
+    <p:sldId id="262" r:id="rId4"/>
+    <p:sldId id="258" r:id="rId5"/>
+    <p:sldId id="270" r:id="rId6"/>
+    <p:sldId id="266" r:id="rId7"/>
+    <p:sldId id="267" r:id="rId8"/>
+    <p:sldId id="268" r:id="rId9"/>
+    <p:sldId id="259" r:id="rId10"/>
+    <p:sldId id="260" r:id="rId11"/>
+    <p:sldId id="263" r:id="rId12"/>
+    <p:sldId id="269" r:id="rId13"/>
+    <p:sldId id="264" r:id="rId14"/>
   </p:sldIdLst>
   <p:sldSz cx="12192000" cy="6858000"/>
   <p:notesSz cx="6858000" cy="9144000"/>
@@ -621,7 +627,7 @@
             <a:fld id="{B61BEF0D-F0BB-DE4B-95CE-6DB70DBA9567}" type="datetimeFigureOut">
               <a:rPr lang="en-US" dirty="0"/>
               <a:pPr/>
-              <a:t>8/11/17</a:t>
+              <a:t>9/20/17</a:t>
             </a:fld>
             <a:endParaRPr lang="en-US" dirty="0"/>
           </a:p>
@@ -914,7 +920,7 @@
             <a:fld id="{B61BEF0D-F0BB-DE4B-95CE-6DB70DBA9567}" type="datetimeFigureOut">
               <a:rPr lang="en-US" dirty="0"/>
               <a:pPr/>
-              <a:t>8/11/17</a:t>
+              <a:t>9/20/17</a:t>
             </a:fld>
             <a:endParaRPr lang="en-US" dirty="0"/>
           </a:p>
@@ -1159,7 +1165,7 @@
             <a:fld id="{B61BEF0D-F0BB-DE4B-95CE-6DB70DBA9567}" type="datetimeFigureOut">
               <a:rPr lang="en-US" dirty="0"/>
               <a:pPr/>
-              <a:t>8/11/17</a:t>
+              <a:t>9/20/17</a:t>
             </a:fld>
             <a:endParaRPr lang="en-US" dirty="0"/>
           </a:p>
@@ -1696,7 +1702,7 @@
             <a:fld id="{B61BEF0D-F0BB-DE4B-95CE-6DB70DBA9567}" type="datetimeFigureOut">
               <a:rPr lang="en-US" dirty="0"/>
               <a:pPr/>
-              <a:t>8/11/17</a:t>
+              <a:t>9/20/17</a:t>
             </a:fld>
             <a:endParaRPr lang="en-US" dirty="0"/>
           </a:p>
@@ -1941,7 +1947,7 @@
             <a:fld id="{B61BEF0D-F0BB-DE4B-95CE-6DB70DBA9567}" type="datetimeFigureOut">
               <a:rPr lang="en-US" dirty="0"/>
               <a:pPr/>
-              <a:t>8/11/17</a:t>
+              <a:t>9/20/17</a:t>
             </a:fld>
             <a:endParaRPr lang="en-US" dirty="0"/>
           </a:p>
@@ -2470,7 +2476,7 @@
             <a:fld id="{B61BEF0D-F0BB-DE4B-95CE-6DB70DBA9567}" type="datetimeFigureOut">
               <a:rPr lang="en-US" dirty="0"/>
               <a:pPr/>
-              <a:t>8/11/17</a:t>
+              <a:t>9/20/17</a:t>
             </a:fld>
             <a:endParaRPr lang="en-US" dirty="0"/>
           </a:p>
@@ -2764,7 +2770,7 @@
             <a:fld id="{B61BEF0D-F0BB-DE4B-95CE-6DB70DBA9567}" type="datetimeFigureOut">
               <a:rPr lang="en-US" dirty="0"/>
               <a:pPr/>
-              <a:t>8/11/17</a:t>
+              <a:t>9/20/17</a:t>
             </a:fld>
             <a:endParaRPr lang="en-US" dirty="0"/>
           </a:p>
@@ -2935,7 +2941,7 @@
             <a:fld id="{B61BEF0D-F0BB-DE4B-95CE-6DB70DBA9567}" type="datetimeFigureOut">
               <a:rPr lang="en-US" dirty="0"/>
               <a:pPr/>
-              <a:t>8/11/17</a:t>
+              <a:t>9/20/17</a:t>
             </a:fld>
             <a:endParaRPr lang="en-US" dirty="0"/>
           </a:p>
@@ -3112,7 +3118,7 @@
             <a:fld id="{B61BEF0D-F0BB-DE4B-95CE-6DB70DBA9567}" type="datetimeFigureOut">
               <a:rPr lang="en-US" dirty="0"/>
               <a:pPr/>
-              <a:t>8/11/17</a:t>
+              <a:t>9/20/17</a:t>
             </a:fld>
             <a:endParaRPr lang="en-US" dirty="0"/>
           </a:p>
@@ -3279,7 +3285,7 @@
             <a:fld id="{B61BEF0D-F0BB-DE4B-95CE-6DB70DBA9567}" type="datetimeFigureOut">
               <a:rPr lang="en-US" dirty="0"/>
               <a:pPr/>
-              <a:t>8/11/17</a:t>
+              <a:t>9/20/17</a:t>
             </a:fld>
             <a:endParaRPr lang="en-US" dirty="0"/>
           </a:p>
@@ -3527,7 +3533,7 @@
             <a:fld id="{B61BEF0D-F0BB-DE4B-95CE-6DB70DBA9567}" type="datetimeFigureOut">
               <a:rPr lang="en-US" dirty="0"/>
               <a:pPr/>
-              <a:t>8/11/17</a:t>
+              <a:t>9/20/17</a:t>
             </a:fld>
             <a:endParaRPr lang="en-US" dirty="0"/>
           </a:p>
@@ -3821,7 +3827,7 @@
             <a:fld id="{B61BEF0D-F0BB-DE4B-95CE-6DB70DBA9567}" type="datetimeFigureOut">
               <a:rPr lang="en-US" dirty="0"/>
               <a:pPr/>
-              <a:t>8/11/17</a:t>
+              <a:t>9/20/17</a:t>
             </a:fld>
             <a:endParaRPr lang="en-US" dirty="0"/>
           </a:p>
@@ -4260,7 +4266,7 @@
             <a:fld id="{B61BEF0D-F0BB-DE4B-95CE-6DB70DBA9567}" type="datetimeFigureOut">
               <a:rPr lang="en-US" dirty="0"/>
               <a:pPr/>
-              <a:t>8/11/17</a:t>
+              <a:t>9/20/17</a:t>
             </a:fld>
             <a:endParaRPr lang="en-US" dirty="0"/>
           </a:p>
@@ -4375,7 +4381,7 @@
             <a:fld id="{B61BEF0D-F0BB-DE4B-95CE-6DB70DBA9567}" type="datetimeFigureOut">
               <a:rPr lang="en-US" dirty="0"/>
               <a:pPr/>
-              <a:t>8/11/17</a:t>
+              <a:t>9/20/17</a:t>
             </a:fld>
             <a:endParaRPr lang="en-US" dirty="0"/>
           </a:p>
@@ -4467,7 +4473,7 @@
             <a:fld id="{B61BEF0D-F0BB-DE4B-95CE-6DB70DBA9567}" type="datetimeFigureOut">
               <a:rPr lang="en-US" dirty="0"/>
               <a:pPr/>
-              <a:t>8/11/17</a:t>
+              <a:t>9/20/17</a:t>
             </a:fld>
             <a:endParaRPr lang="en-US" dirty="0"/>
           </a:p>
@@ -4747,7 +4753,7 @@
             <a:fld id="{B61BEF0D-F0BB-DE4B-95CE-6DB70DBA9567}" type="datetimeFigureOut">
               <a:rPr lang="en-US" dirty="0"/>
               <a:pPr/>
-              <a:t>8/11/17</a:t>
+              <a:t>9/20/17</a:t>
             </a:fld>
             <a:endParaRPr lang="en-US" dirty="0"/>
           </a:p>
@@ -5035,7 +5041,7 @@
             <a:fld id="{B61BEF0D-F0BB-DE4B-95CE-6DB70DBA9567}" type="datetimeFigureOut">
               <a:rPr lang="en-US" dirty="0"/>
               <a:pPr/>
-              <a:t>8/11/17</a:t>
+              <a:t>9/20/17</a:t>
             </a:fld>
             <a:endParaRPr lang="en-US" dirty="0"/>
           </a:p>
@@ -5562,7 +5568,7 @@
             <a:fld id="{B61BEF0D-F0BB-DE4B-95CE-6DB70DBA9567}" type="datetimeFigureOut">
               <a:rPr lang="en-US" dirty="0"/>
               <a:pPr/>
-              <a:t>8/11/17</a:t>
+              <a:t>9/20/17</a:t>
             </a:fld>
             <a:endParaRPr lang="en-US" dirty="0"/>
           </a:p>
@@ -6205,7 +6211,1452 @@
 </p:sld>
 </file>
 
+<file path=ppt/slides/slide10.xml><?xml version="1.0" encoding="utf-8"?>
+<p:sld xmlns:a="http://schemas.openxmlformats.org/drawingml/2006/main" xmlns:r="http://schemas.openxmlformats.org/officeDocument/2006/relationships" xmlns:p="http://schemas.openxmlformats.org/presentationml/2006/main">
+  <p:cSld>
+    <p:spTree>
+      <p:nvGrpSpPr>
+        <p:cNvPr id="1" name=""/>
+        <p:cNvGrpSpPr/>
+        <p:nvPr/>
+      </p:nvGrpSpPr>
+      <p:grpSpPr>
+        <a:xfrm>
+          <a:off x="0" y="0"/>
+          <a:ext cx="0" cy="0"/>
+          <a:chOff x="0" y="0"/>
+          <a:chExt cx="0" cy="0"/>
+        </a:xfrm>
+      </p:grpSpPr>
+      <p:sp>
+        <p:nvSpPr>
+          <p:cNvPr id="2" name="Título 1"/>
+          <p:cNvSpPr>
+            <a:spLocks noGrp="1"/>
+          </p:cNvSpPr>
+          <p:nvPr>
+            <p:ph type="title"/>
+          </p:nvPr>
+        </p:nvSpPr>
+        <p:spPr>
+          <a:xfrm>
+            <a:off x="1484310" y="117389"/>
+            <a:ext cx="10018713" cy="673443"/>
+          </a:xfrm>
+        </p:spPr>
+        <p:txBody>
+          <a:bodyPr>
+            <a:normAutofit fontScale="90000"/>
+          </a:bodyPr>
+          <a:lstStyle/>
+          <a:p>
+            <a:r>
+              <a:rPr lang="es-ES" dirty="0" smtClean="0"/>
+              <a:t>Estados de </a:t>
+            </a:r>
+            <a:r>
+              <a:rPr lang="es-ES_tradnl" dirty="0" smtClean="0"/>
+              <a:t>GIT</a:t>
+            </a:r>
+            <a:endParaRPr lang="es-ES_tradnl" dirty="0"/>
+          </a:p>
+        </p:txBody>
+      </p:sp>
+      <p:pic>
+        <p:nvPicPr>
+          <p:cNvPr id="5" name="Imagen 4"/>
+          <p:cNvPicPr>
+            <a:picLocks noChangeAspect="1"/>
+          </p:cNvPicPr>
+          <p:nvPr/>
+        </p:nvPicPr>
+        <p:blipFill>
+          <a:blip r:embed="rId2">
+            <a:extLst>
+              <a:ext uri="{28A0092B-C50C-407E-A947-70E740481C1C}">
+                <a14:useLocalDpi xmlns:a14="http://schemas.microsoft.com/office/drawing/2010/main" val="0"/>
+              </a:ext>
+            </a:extLst>
+          </a:blip>
+          <a:stretch>
+            <a:fillRect/>
+          </a:stretch>
+        </p:blipFill>
+        <p:spPr>
+          <a:xfrm>
+            <a:off x="1484310" y="1283730"/>
+            <a:ext cx="4270512" cy="4017319"/>
+          </a:xfrm>
+          <a:prstGeom prst="rect">
+            <a:avLst/>
+          </a:prstGeom>
+        </p:spPr>
+      </p:pic>
+      <p:sp>
+        <p:nvSpPr>
+          <p:cNvPr id="6" name="CuadroTexto 5"/>
+          <p:cNvSpPr txBox="1"/>
+          <p:nvPr/>
+        </p:nvSpPr>
+        <p:spPr>
+          <a:xfrm>
+            <a:off x="6263758" y="1283730"/>
+            <a:ext cx="5239265" cy="2862322"/>
+          </a:xfrm>
+          <a:prstGeom prst="rect">
+            <a:avLst/>
+          </a:prstGeom>
+          <a:noFill/>
+        </p:spPr>
+        <p:txBody>
+          <a:bodyPr wrap="square" rtlCol="0">
+            <a:spAutoFit/>
+          </a:bodyPr>
+          <a:lstStyle/>
+          <a:p>
+            <a:pPr marL="285750" indent="-285750" algn="just">
+              <a:buFont typeface="Arial" charset="0"/>
+              <a:buChar char="•"/>
+            </a:pPr>
+            <a:r>
+              <a:rPr lang="es-ES_tradnl" b="1" dirty="0"/>
+              <a:t>C</a:t>
+            </a:r>
+            <a:r>
+              <a:rPr lang="es-ES_tradnl" b="1" dirty="0" smtClean="0"/>
+              <a:t>onfirmado (</a:t>
+            </a:r>
+            <a:r>
+              <a:rPr lang="es-ES_tradnl" b="1" dirty="0" err="1" smtClean="0"/>
+              <a:t>committed</a:t>
+            </a:r>
+            <a:r>
+              <a:rPr lang="es-ES_tradnl" b="1" dirty="0" smtClean="0"/>
+              <a:t>): </a:t>
+            </a:r>
+            <a:r>
+              <a:rPr lang="es-ES_tradnl" dirty="0" smtClean="0"/>
+              <a:t>Los datos </a:t>
+            </a:r>
+            <a:r>
+              <a:rPr lang="es-ES_tradnl" dirty="0" err="1" smtClean="0"/>
+              <a:t>estan</a:t>
+            </a:r>
+            <a:r>
+              <a:rPr lang="es-ES_tradnl" dirty="0" smtClean="0"/>
+              <a:t> almacenados de manera segura en tu base de datos local.</a:t>
+            </a:r>
+            <a:endParaRPr lang="es-ES_tradnl" b="1" dirty="0" smtClean="0"/>
+          </a:p>
+          <a:p>
+            <a:pPr marL="285750" indent="-285750" algn="just">
+              <a:buFont typeface="Arial" charset="0"/>
+              <a:buChar char="•"/>
+            </a:pPr>
+            <a:r>
+              <a:rPr lang="es-ES_tradnl" b="1" dirty="0"/>
+              <a:t>M</a:t>
+            </a:r>
+            <a:r>
+              <a:rPr lang="es-ES_tradnl" b="1" dirty="0" smtClean="0"/>
+              <a:t>odificado (</a:t>
+            </a:r>
+            <a:r>
+              <a:rPr lang="es-ES_tradnl" b="1" dirty="0" err="1" smtClean="0"/>
+              <a:t>modified</a:t>
+            </a:r>
+            <a:r>
+              <a:rPr lang="es-ES_tradnl" b="1" dirty="0" smtClean="0"/>
+              <a:t>): </a:t>
+            </a:r>
+            <a:r>
+              <a:rPr lang="es-ES_tradnl" dirty="0" smtClean="0"/>
+              <a:t>Significa que has modificado </a:t>
+            </a:r>
+            <a:r>
+              <a:rPr lang="es-ES_tradnl" dirty="0" err="1" smtClean="0"/>
+              <a:t>algun</a:t>
+            </a:r>
+            <a:r>
+              <a:rPr lang="es-ES_tradnl" dirty="0" smtClean="0"/>
+              <a:t> archivo pero que aun no lo confirmas.</a:t>
+            </a:r>
+            <a:endParaRPr lang="es-ES_tradnl" b="1" dirty="0" smtClean="0"/>
+          </a:p>
+          <a:p>
+            <a:pPr marL="285750" indent="-285750" algn="just">
+              <a:buFont typeface="Arial" charset="0"/>
+              <a:buChar char="•"/>
+            </a:pPr>
+            <a:r>
+              <a:rPr lang="es-ES_tradnl" b="1" dirty="0"/>
+              <a:t>P</a:t>
+            </a:r>
+            <a:r>
+              <a:rPr lang="es-ES_tradnl" b="1" dirty="0" smtClean="0"/>
+              <a:t>reparado (</a:t>
+            </a:r>
+            <a:r>
+              <a:rPr lang="es-ES_tradnl" b="1" dirty="0" err="1" smtClean="0"/>
+              <a:t>stage</a:t>
+            </a:r>
+            <a:r>
+              <a:rPr lang="es-ES_tradnl" b="1" dirty="0" smtClean="0"/>
+              <a:t>): </a:t>
+            </a:r>
+            <a:r>
+              <a:rPr lang="es-ES_tradnl" dirty="0" smtClean="0"/>
+              <a:t>Significa que has marcado algún archivo modificado en su versión actual  para confirmarlo.</a:t>
+            </a:r>
+          </a:p>
+          <a:p>
+            <a:pPr marL="285750" indent="-285750" algn="just">
+              <a:buFont typeface="Arial" charset="0"/>
+              <a:buChar char="•"/>
+            </a:pPr>
+            <a:endParaRPr lang="es-ES_tradnl" b="1" dirty="0"/>
+          </a:p>
+        </p:txBody>
+      </p:sp>
+      <p:sp>
+        <p:nvSpPr>
+          <p:cNvPr id="7" name="CuadroTexto 6"/>
+          <p:cNvSpPr txBox="1"/>
+          <p:nvPr/>
+        </p:nvSpPr>
+        <p:spPr>
+          <a:xfrm>
+            <a:off x="6263758" y="4146052"/>
+            <a:ext cx="5536945" cy="1785104"/>
+          </a:xfrm>
+          <a:prstGeom prst="rect">
+            <a:avLst/>
+          </a:prstGeom>
+          <a:noFill/>
+        </p:spPr>
+        <p:txBody>
+          <a:bodyPr wrap="square" rtlCol="0">
+            <a:spAutoFit/>
+          </a:bodyPr>
+          <a:lstStyle/>
+          <a:p>
+            <a:r>
+              <a:rPr lang="es-ES_tradnl" b="1" dirty="0" smtClean="0"/>
+              <a:t>FLUJO DE TRABAJO</a:t>
+            </a:r>
+          </a:p>
+          <a:p>
+            <a:pPr marL="342900" indent="-342900">
+              <a:buFont typeface="+mj-lt"/>
+              <a:buAutoNum type="arabicPeriod"/>
+            </a:pPr>
+            <a:r>
+              <a:rPr lang="es-ES_tradnl" dirty="0" smtClean="0"/>
+              <a:t>Modificar archivos en directorio trabajo.</a:t>
+            </a:r>
+          </a:p>
+          <a:p>
+            <a:pPr marL="342900" indent="-342900">
+              <a:buFont typeface="+mj-lt"/>
+              <a:buAutoNum type="arabicPeriod"/>
+            </a:pPr>
+            <a:r>
+              <a:rPr lang="es-ES_tradnl" dirty="0" smtClean="0"/>
+              <a:t>Preparar los archivo, </a:t>
+            </a:r>
+            <a:r>
+              <a:rPr lang="es-ES_tradnl" dirty="0" err="1" smtClean="0"/>
+              <a:t>instantaneas</a:t>
+            </a:r>
+            <a:r>
+              <a:rPr lang="es-ES_tradnl" dirty="0" smtClean="0"/>
+              <a:t> en el área de preparación.</a:t>
+            </a:r>
+          </a:p>
+          <a:p>
+            <a:pPr marL="342900" indent="-342900">
+              <a:buFont typeface="+mj-lt"/>
+              <a:buAutoNum type="arabicPeriod"/>
+            </a:pPr>
+            <a:r>
+              <a:rPr lang="es-ES_tradnl" dirty="0" smtClean="0"/>
+              <a:t>Confirmar los cambios, almacenando sus instantáneas en el directorio GIT.</a:t>
+            </a:r>
+            <a:endParaRPr lang="es-ES_tradnl" dirty="0"/>
+          </a:p>
+        </p:txBody>
+      </p:sp>
+      <p:sp>
+        <p:nvSpPr>
+          <p:cNvPr id="9" name="CuadroTexto 8"/>
+          <p:cNvSpPr txBox="1"/>
+          <p:nvPr/>
+        </p:nvSpPr>
+        <p:spPr>
+          <a:xfrm>
+            <a:off x="56876" y="6340526"/>
+            <a:ext cx="2902205" cy="369332"/>
+          </a:xfrm>
+          <a:prstGeom prst="rect">
+            <a:avLst/>
+          </a:prstGeom>
+          <a:solidFill>
+            <a:schemeClr val="tx2">
+              <a:lumMod val="75000"/>
+              <a:lumOff val="25000"/>
+            </a:schemeClr>
+          </a:solidFill>
+        </p:spPr>
+        <p:txBody>
+          <a:bodyPr wrap="none" rtlCol="0">
+            <a:spAutoFit/>
+          </a:bodyPr>
+          <a:lstStyle/>
+          <a:p>
+            <a:r>
+              <a:rPr lang="es-ES_tradnl" dirty="0" smtClean="0">
+                <a:solidFill>
+                  <a:schemeClr val="bg1"/>
+                </a:solidFill>
+              </a:rPr>
+              <a:t>Fuente: https</a:t>
+            </a:r>
+            <a:r>
+              <a:rPr lang="es-ES_tradnl" dirty="0">
+                <a:solidFill>
+                  <a:schemeClr val="bg1"/>
+                </a:solidFill>
+              </a:rPr>
+              <a:t>://</a:t>
+            </a:r>
+            <a:r>
+              <a:rPr lang="es-ES_tradnl" dirty="0" err="1">
+                <a:solidFill>
+                  <a:schemeClr val="bg1"/>
+                </a:solidFill>
+              </a:rPr>
+              <a:t>git-scm.com</a:t>
+            </a:r>
+            <a:r>
+              <a:rPr lang="es-ES_tradnl" dirty="0">
+                <a:solidFill>
+                  <a:schemeClr val="bg1"/>
+                </a:solidFill>
+              </a:rPr>
+              <a:t>/</a:t>
+            </a:r>
+          </a:p>
+        </p:txBody>
+      </p:sp>
+    </p:spTree>
+    <p:extLst>
+      <p:ext uri="{BB962C8B-B14F-4D97-AF65-F5344CB8AC3E}">
+        <p14:creationId xmlns:p14="http://schemas.microsoft.com/office/powerpoint/2010/main" val="1646112634"/>
+      </p:ext>
+    </p:extLst>
+  </p:cSld>
+  <p:clrMapOvr>
+    <a:masterClrMapping/>
+  </p:clrMapOvr>
+</p:sld>
+</file>
+
+<file path=ppt/slides/slide11.xml><?xml version="1.0" encoding="utf-8"?>
+<p:sld xmlns:a="http://schemas.openxmlformats.org/drawingml/2006/main" xmlns:r="http://schemas.openxmlformats.org/officeDocument/2006/relationships" xmlns:p="http://schemas.openxmlformats.org/presentationml/2006/main">
+  <p:cSld>
+    <p:spTree>
+      <p:nvGrpSpPr>
+        <p:cNvPr id="1" name=""/>
+        <p:cNvGrpSpPr/>
+        <p:nvPr/>
+      </p:nvGrpSpPr>
+      <p:grpSpPr>
+        <a:xfrm>
+          <a:off x="0" y="0"/>
+          <a:ext cx="0" cy="0"/>
+          <a:chOff x="0" y="0"/>
+          <a:chExt cx="0" cy="0"/>
+        </a:xfrm>
+      </p:grpSpPr>
+      <p:sp>
+        <p:nvSpPr>
+          <p:cNvPr id="2" name="Título 1"/>
+          <p:cNvSpPr>
+            <a:spLocks noGrp="1"/>
+          </p:cNvSpPr>
+          <p:nvPr>
+            <p:ph type="title"/>
+          </p:nvPr>
+        </p:nvSpPr>
+        <p:spPr>
+          <a:xfrm>
+            <a:off x="1484310" y="117389"/>
+            <a:ext cx="10018713" cy="673443"/>
+          </a:xfrm>
+        </p:spPr>
+        <p:txBody>
+          <a:bodyPr>
+            <a:normAutofit fontScale="90000"/>
+          </a:bodyPr>
+          <a:lstStyle/>
+          <a:p>
+            <a:r>
+              <a:rPr lang="es-ES" dirty="0" smtClean="0"/>
+              <a:t>Ramas en </a:t>
+            </a:r>
+            <a:r>
+              <a:rPr lang="es-ES_tradnl" dirty="0" smtClean="0"/>
+              <a:t>GIT (</a:t>
+            </a:r>
+            <a:r>
+              <a:rPr lang="es-ES_tradnl" dirty="0" err="1" smtClean="0"/>
+              <a:t>branching</a:t>
+            </a:r>
+            <a:r>
+              <a:rPr lang="es-ES_tradnl" dirty="0" smtClean="0"/>
+              <a:t>)</a:t>
+            </a:r>
+            <a:endParaRPr lang="es-ES_tradnl" dirty="0"/>
+          </a:p>
+        </p:txBody>
+      </p:sp>
+      <p:sp>
+        <p:nvSpPr>
+          <p:cNvPr id="6" name="CuadroTexto 5"/>
+          <p:cNvSpPr txBox="1"/>
+          <p:nvPr/>
+        </p:nvSpPr>
+        <p:spPr>
+          <a:xfrm>
+            <a:off x="6263758" y="1283730"/>
+            <a:ext cx="5239265" cy="4247317"/>
+          </a:xfrm>
+          <a:prstGeom prst="rect">
+            <a:avLst/>
+          </a:prstGeom>
+          <a:noFill/>
+        </p:spPr>
+        <p:txBody>
+          <a:bodyPr wrap="square" rtlCol="0">
+            <a:spAutoFit/>
+          </a:bodyPr>
+          <a:lstStyle/>
+          <a:p>
+            <a:pPr marL="285750" indent="-285750" algn="just">
+              <a:buFont typeface="Arial" charset="0"/>
+              <a:buChar char="•"/>
+            </a:pPr>
+            <a:r>
+              <a:rPr lang="es-ES_tradnl" dirty="0" smtClean="0"/>
+              <a:t>Existe una rama principal (master), la cual es la inicial.</a:t>
+            </a:r>
+          </a:p>
+          <a:p>
+            <a:pPr marL="285750" indent="-285750" algn="just">
+              <a:buFont typeface="Arial" charset="0"/>
+              <a:buChar char="•"/>
+            </a:pPr>
+            <a:r>
+              <a:rPr lang="es-ES_tradnl" dirty="0" smtClean="0"/>
+              <a:t>Se pueden crear ramas en base a master o </a:t>
+            </a:r>
+            <a:r>
+              <a:rPr lang="es-ES_tradnl" dirty="0" err="1" smtClean="0"/>
+              <a:t>subramas</a:t>
+            </a:r>
+            <a:r>
+              <a:rPr lang="es-ES_tradnl" dirty="0" smtClean="0"/>
+              <a:t> (copia de archivos desde rama).</a:t>
+            </a:r>
+          </a:p>
+          <a:p>
+            <a:pPr marL="285750" indent="-285750" algn="just">
+              <a:buFont typeface="Arial" charset="0"/>
+              <a:buChar char="•"/>
+            </a:pPr>
+            <a:r>
+              <a:rPr lang="es-ES_tradnl" dirty="0"/>
+              <a:t>Cada </a:t>
+            </a:r>
+            <a:r>
+              <a:rPr lang="es-ES_tradnl" dirty="0" err="1"/>
+              <a:t>commit</a:t>
+            </a:r>
+            <a:r>
+              <a:rPr lang="es-ES_tradnl" dirty="0"/>
+              <a:t> almacena las instantáneas de los archivos en base a su </a:t>
+            </a:r>
+            <a:r>
+              <a:rPr lang="es-ES_tradnl" dirty="0" err="1" smtClean="0"/>
+              <a:t>checksum</a:t>
+            </a:r>
+            <a:r>
+              <a:rPr lang="es-ES_tradnl" dirty="0" smtClean="0"/>
+              <a:t> (nodo verde).</a:t>
+            </a:r>
+          </a:p>
+          <a:p>
+            <a:pPr marL="285750" indent="-285750" algn="just">
+              <a:buFont typeface="Arial" charset="0"/>
+              <a:buChar char="•"/>
+            </a:pPr>
+            <a:r>
+              <a:rPr lang="es-ES_tradnl" dirty="0" smtClean="0"/>
+              <a:t>Se avanza en paralelo en las diferentes ramas realizando cambios.</a:t>
+            </a:r>
+          </a:p>
+          <a:p>
+            <a:pPr marL="285750" indent="-285750" algn="just">
+              <a:buFont typeface="Arial" charset="0"/>
+              <a:buChar char="•"/>
+            </a:pPr>
+            <a:r>
+              <a:rPr lang="es-ES_tradnl" dirty="0" smtClean="0"/>
+              <a:t>HEAD es el apuntador que nos indica en la </a:t>
+            </a:r>
+            <a:r>
+              <a:rPr lang="es-ES_tradnl" dirty="0" err="1" smtClean="0"/>
+              <a:t>version</a:t>
+            </a:r>
+            <a:r>
+              <a:rPr lang="es-ES_tradnl" dirty="0" smtClean="0"/>
+              <a:t> y rama que nos encontramos, la cual se puede mover entre ramas (</a:t>
+            </a:r>
+            <a:r>
+              <a:rPr lang="es-ES_tradnl" dirty="0" err="1" smtClean="0"/>
+              <a:t>checkout</a:t>
+            </a:r>
+            <a:r>
+              <a:rPr lang="es-ES_tradnl" dirty="0" smtClean="0"/>
+              <a:t>).</a:t>
+            </a:r>
+          </a:p>
+          <a:p>
+            <a:pPr marL="285750" indent="-285750" algn="just">
+              <a:buFont typeface="Arial" charset="0"/>
+              <a:buChar char="•"/>
+            </a:pPr>
+            <a:r>
+              <a:rPr lang="es-ES_tradnl" dirty="0" smtClean="0"/>
+              <a:t>Al fusionar las ramas, se arrastran los cambios a la rama principal (fusión de cambios).</a:t>
+            </a:r>
+          </a:p>
+          <a:p>
+            <a:pPr marL="285750" indent="-285750" algn="just">
+              <a:buFont typeface="Arial" charset="0"/>
+              <a:buChar char="•"/>
+            </a:pPr>
+            <a:endParaRPr lang="es-ES_tradnl" dirty="0" smtClean="0"/>
+          </a:p>
+          <a:p>
+            <a:pPr marL="285750" indent="-285750" algn="just">
+              <a:buFont typeface="Arial" charset="0"/>
+              <a:buChar char="•"/>
+            </a:pPr>
+            <a:endParaRPr lang="es-ES_tradnl" b="1" dirty="0"/>
+          </a:p>
+        </p:txBody>
+      </p:sp>
+      <p:pic>
+        <p:nvPicPr>
+          <p:cNvPr id="8" name="Imagen 7"/>
+          <p:cNvPicPr>
+            <a:picLocks noChangeAspect="1"/>
+          </p:cNvPicPr>
+          <p:nvPr/>
+        </p:nvPicPr>
+        <p:blipFill>
+          <a:blip r:embed="rId2">
+            <a:extLst>
+              <a:ext uri="{28A0092B-C50C-407E-A947-70E740481C1C}">
+                <a14:useLocalDpi xmlns:a14="http://schemas.microsoft.com/office/drawing/2010/main" val="0"/>
+              </a:ext>
+            </a:extLst>
+          </a:blip>
+          <a:stretch>
+            <a:fillRect/>
+          </a:stretch>
+        </p:blipFill>
+        <p:spPr>
+          <a:xfrm>
+            <a:off x="1176638" y="1038998"/>
+            <a:ext cx="4965259" cy="5213522"/>
+          </a:xfrm>
+          <a:prstGeom prst="rect">
+            <a:avLst/>
+          </a:prstGeom>
+        </p:spPr>
+      </p:pic>
+      <p:sp>
+        <p:nvSpPr>
+          <p:cNvPr id="7" name="CuadroTexto 6"/>
+          <p:cNvSpPr txBox="1"/>
+          <p:nvPr/>
+        </p:nvSpPr>
+        <p:spPr>
+          <a:xfrm>
+            <a:off x="56876" y="6340526"/>
+            <a:ext cx="2902205" cy="369332"/>
+          </a:xfrm>
+          <a:prstGeom prst="rect">
+            <a:avLst/>
+          </a:prstGeom>
+          <a:solidFill>
+            <a:schemeClr val="tx2">
+              <a:lumMod val="75000"/>
+              <a:lumOff val="25000"/>
+            </a:schemeClr>
+          </a:solidFill>
+        </p:spPr>
+        <p:txBody>
+          <a:bodyPr wrap="none" rtlCol="0">
+            <a:spAutoFit/>
+          </a:bodyPr>
+          <a:lstStyle/>
+          <a:p>
+            <a:r>
+              <a:rPr lang="es-ES_tradnl" dirty="0" smtClean="0">
+                <a:solidFill>
+                  <a:schemeClr val="bg1"/>
+                </a:solidFill>
+              </a:rPr>
+              <a:t>Fuente: https</a:t>
+            </a:r>
+            <a:r>
+              <a:rPr lang="es-ES_tradnl" dirty="0">
+                <a:solidFill>
+                  <a:schemeClr val="bg1"/>
+                </a:solidFill>
+              </a:rPr>
+              <a:t>://</a:t>
+            </a:r>
+            <a:r>
+              <a:rPr lang="es-ES_tradnl" dirty="0" err="1">
+                <a:solidFill>
+                  <a:schemeClr val="bg1"/>
+                </a:solidFill>
+              </a:rPr>
+              <a:t>git-scm.com</a:t>
+            </a:r>
+            <a:r>
+              <a:rPr lang="es-ES_tradnl" dirty="0">
+                <a:solidFill>
+                  <a:schemeClr val="bg1"/>
+                </a:solidFill>
+              </a:rPr>
+              <a:t>/</a:t>
+            </a:r>
+          </a:p>
+        </p:txBody>
+      </p:sp>
+    </p:spTree>
+    <p:extLst>
+      <p:ext uri="{BB962C8B-B14F-4D97-AF65-F5344CB8AC3E}">
+        <p14:creationId xmlns:p14="http://schemas.microsoft.com/office/powerpoint/2010/main" val="1378200591"/>
+      </p:ext>
+    </p:extLst>
+  </p:cSld>
+  <p:clrMapOvr>
+    <a:masterClrMapping/>
+  </p:clrMapOvr>
+</p:sld>
+</file>
+
+<file path=ppt/slides/slide12.xml><?xml version="1.0" encoding="utf-8"?>
+<p:sld xmlns:a="http://schemas.openxmlformats.org/drawingml/2006/main" xmlns:r="http://schemas.openxmlformats.org/officeDocument/2006/relationships" xmlns:p="http://schemas.openxmlformats.org/presentationml/2006/main">
+  <p:cSld>
+    <p:spTree>
+      <p:nvGrpSpPr>
+        <p:cNvPr id="1" name=""/>
+        <p:cNvGrpSpPr/>
+        <p:nvPr/>
+      </p:nvGrpSpPr>
+      <p:grpSpPr>
+        <a:xfrm>
+          <a:off x="0" y="0"/>
+          <a:ext cx="0" cy="0"/>
+          <a:chOff x="0" y="0"/>
+          <a:chExt cx="0" cy="0"/>
+        </a:xfrm>
+      </p:grpSpPr>
+      <p:sp>
+        <p:nvSpPr>
+          <p:cNvPr id="2" name="Título 1"/>
+          <p:cNvSpPr>
+            <a:spLocks noGrp="1"/>
+          </p:cNvSpPr>
+          <p:nvPr>
+            <p:ph type="title"/>
+          </p:nvPr>
+        </p:nvSpPr>
+        <p:spPr/>
+        <p:txBody>
+          <a:bodyPr/>
+          <a:lstStyle/>
+          <a:p>
+            <a:r>
+              <a:rPr lang="es-ES_tradnl" dirty="0" smtClean="0"/>
+              <a:t>¿C</a:t>
+            </a:r>
+            <a:r>
+              <a:rPr lang="es-ES" dirty="0" err="1" smtClean="0"/>
+              <a:t>ómo</a:t>
+            </a:r>
+            <a:r>
+              <a:rPr lang="es-ES" dirty="0" smtClean="0"/>
+              <a:t> </a:t>
+            </a:r>
+            <a:r>
+              <a:rPr lang="es-ES" dirty="0" smtClean="0"/>
+              <a:t>lo </a:t>
+            </a:r>
+            <a:r>
+              <a:rPr lang="es-ES" dirty="0" smtClean="0"/>
+              <a:t>utilizo?</a:t>
+            </a:r>
+            <a:endParaRPr lang="es-ES_tradnl" dirty="0"/>
+          </a:p>
+        </p:txBody>
+      </p:sp>
+      <p:sp>
+        <p:nvSpPr>
+          <p:cNvPr id="3" name="Marcador de contenido 2"/>
+          <p:cNvSpPr>
+            <a:spLocks noGrp="1"/>
+          </p:cNvSpPr>
+          <p:nvPr>
+            <p:ph idx="1"/>
+          </p:nvPr>
+        </p:nvSpPr>
+        <p:spPr/>
+        <p:txBody>
+          <a:bodyPr/>
+          <a:lstStyle/>
+          <a:p>
+            <a:endParaRPr lang="es-ES_tradnl"/>
+          </a:p>
+        </p:txBody>
+      </p:sp>
+    </p:spTree>
+    <p:extLst>
+      <p:ext uri="{BB962C8B-B14F-4D97-AF65-F5344CB8AC3E}">
+        <p14:creationId xmlns:p14="http://schemas.microsoft.com/office/powerpoint/2010/main" val="881217806"/>
+      </p:ext>
+    </p:extLst>
+  </p:cSld>
+  <p:clrMapOvr>
+    <a:masterClrMapping/>
+  </p:clrMapOvr>
+</p:sld>
+</file>
+
+<file path=ppt/slides/slide13.xml><?xml version="1.0" encoding="utf-8"?>
+<p:sld xmlns:a="http://schemas.openxmlformats.org/drawingml/2006/main" xmlns:r="http://schemas.openxmlformats.org/officeDocument/2006/relationships" xmlns:p="http://schemas.openxmlformats.org/presentationml/2006/main">
+  <p:cSld>
+    <p:spTree>
+      <p:nvGrpSpPr>
+        <p:cNvPr id="1" name=""/>
+        <p:cNvGrpSpPr/>
+        <p:nvPr/>
+      </p:nvGrpSpPr>
+      <p:grpSpPr>
+        <a:xfrm>
+          <a:off x="0" y="0"/>
+          <a:ext cx="0" cy="0"/>
+          <a:chOff x="0" y="0"/>
+          <a:chExt cx="0" cy="0"/>
+        </a:xfrm>
+      </p:grpSpPr>
+      <p:sp>
+        <p:nvSpPr>
+          <p:cNvPr id="2" name="Título 1"/>
+          <p:cNvSpPr>
+            <a:spLocks noGrp="1"/>
+          </p:cNvSpPr>
+          <p:nvPr>
+            <p:ph type="title"/>
+          </p:nvPr>
+        </p:nvSpPr>
+        <p:spPr>
+          <a:xfrm>
+            <a:off x="1484310" y="117389"/>
+            <a:ext cx="10018713" cy="673443"/>
+          </a:xfrm>
+        </p:spPr>
+        <p:txBody>
+          <a:bodyPr>
+            <a:normAutofit fontScale="90000"/>
+          </a:bodyPr>
+          <a:lstStyle/>
+          <a:p>
+            <a:r>
+              <a:rPr lang="es-ES" dirty="0" smtClean="0"/>
+              <a:t>Actividades con GIT</a:t>
+            </a:r>
+            <a:endParaRPr lang="es-ES_tradnl" dirty="0"/>
+          </a:p>
+        </p:txBody>
+      </p:sp>
+      <p:sp>
+        <p:nvSpPr>
+          <p:cNvPr id="6" name="CuadroTexto 5"/>
+          <p:cNvSpPr txBox="1"/>
+          <p:nvPr/>
+        </p:nvSpPr>
+        <p:spPr>
+          <a:xfrm>
+            <a:off x="1804086" y="1283730"/>
+            <a:ext cx="9698937" cy="3416320"/>
+          </a:xfrm>
+          <a:prstGeom prst="rect">
+            <a:avLst/>
+          </a:prstGeom>
+          <a:noFill/>
+        </p:spPr>
+        <p:txBody>
+          <a:bodyPr wrap="square" rtlCol="0">
+            <a:spAutoFit/>
+          </a:bodyPr>
+          <a:lstStyle/>
+          <a:p>
+            <a:pPr marL="342900" marR="0" lvl="0" indent="-342900" algn="just" defTabSz="914400" eaLnBrk="1" fontAlgn="auto" latinLnBrk="0" hangingPunct="1">
+              <a:lnSpc>
+                <a:spcPct val="100000"/>
+              </a:lnSpc>
+              <a:spcBef>
+                <a:spcPts val="0"/>
+              </a:spcBef>
+              <a:spcAft>
+                <a:spcPts val="0"/>
+              </a:spcAft>
+              <a:buClrTx/>
+              <a:buSzTx/>
+              <a:buFont typeface="+mj-lt"/>
+              <a:buAutoNum type="arabicPeriod"/>
+              <a:tabLst/>
+              <a:defRPr/>
+            </a:pPr>
+            <a:r>
+              <a:rPr lang="es-ES_tradnl" dirty="0" smtClean="0"/>
+              <a:t>Crear cuenta</a:t>
+            </a:r>
+          </a:p>
+          <a:p>
+            <a:pPr marL="800100" lvl="1" indent="-342900" algn="just" defTabSz="914400">
+              <a:buFont typeface="+mj-lt"/>
+              <a:buAutoNum type="alphaLcParenR"/>
+            </a:pPr>
+            <a:r>
+              <a:rPr lang="es-ES_tradnl" dirty="0" smtClean="0"/>
+              <a:t>Registro en </a:t>
+            </a:r>
+            <a:r>
+              <a:rPr lang="es-ES_tradnl" dirty="0" err="1" smtClean="0"/>
+              <a:t>github</a:t>
+            </a:r>
+            <a:r>
+              <a:rPr lang="es-ES_tradnl" dirty="0" smtClean="0"/>
+              <a:t>.</a:t>
+            </a:r>
+          </a:p>
+          <a:p>
+            <a:pPr marL="800100" lvl="1" indent="-342900" algn="just" defTabSz="914400">
+              <a:buFont typeface="+mj-lt"/>
+              <a:buAutoNum type="alphaLcParenR"/>
+            </a:pPr>
+            <a:r>
+              <a:rPr lang="es-ES_tradnl" dirty="0" smtClean="0"/>
+              <a:t>Crear un proyecto (repositorio) de prueba.</a:t>
+            </a:r>
+          </a:p>
+          <a:p>
+            <a:pPr marL="800100" lvl="1" indent="-342900" algn="just" defTabSz="914400">
+              <a:buFont typeface="+mj-lt"/>
+              <a:buAutoNum type="alphaLcParenR"/>
+            </a:pPr>
+            <a:r>
+              <a:rPr lang="es-ES_tradnl" dirty="0" smtClean="0"/>
+              <a:t>Crear un archivo y realizar cambios.</a:t>
+            </a:r>
+          </a:p>
+          <a:p>
+            <a:pPr marL="800100" lvl="1" indent="-342900" algn="just" defTabSz="914400">
+              <a:buFont typeface="+mj-lt"/>
+              <a:buAutoNum type="alphaLcParenR"/>
+            </a:pPr>
+            <a:r>
+              <a:rPr lang="es-ES_tradnl" dirty="0" smtClean="0"/>
+              <a:t>Confirmar los cambios y subir cambios.</a:t>
+            </a:r>
+          </a:p>
+          <a:p>
+            <a:pPr marL="800100" lvl="1" indent="-342900" algn="just" defTabSz="914400">
+              <a:buFont typeface="+mj-lt"/>
+              <a:buAutoNum type="alphaLcParenR"/>
+            </a:pPr>
+            <a:endParaRPr lang="es-ES_tradnl" dirty="0" smtClean="0"/>
+          </a:p>
+          <a:p>
+            <a:pPr marL="342900" indent="-342900" algn="just" defTabSz="914400">
+              <a:buFont typeface="+mj-lt"/>
+              <a:buAutoNum type="arabicPeriod"/>
+            </a:pPr>
+            <a:r>
+              <a:rPr lang="es-ES_tradnl" dirty="0" smtClean="0"/>
+              <a:t>Clonar un proyecto existente</a:t>
+            </a:r>
+          </a:p>
+          <a:p>
+            <a:pPr marL="800100" lvl="1" indent="-342900" algn="just" defTabSz="914400">
+              <a:buFont typeface="+mj-lt"/>
+              <a:buAutoNum type="alphaLcParenR"/>
+            </a:pPr>
+            <a:r>
+              <a:rPr lang="es-ES_tradnl" dirty="0" smtClean="0"/>
+              <a:t>Ubicarse en la rama correspondiente.</a:t>
+            </a:r>
+          </a:p>
+          <a:p>
+            <a:pPr marL="800100" lvl="1" indent="-342900" algn="just" defTabSz="914400">
+              <a:buFont typeface="+mj-lt"/>
+              <a:buAutoNum type="alphaLcParenR"/>
+            </a:pPr>
+            <a:r>
+              <a:rPr lang="es-ES_tradnl" dirty="0" smtClean="0"/>
+              <a:t>Realizar cambios a un determinado archivo.</a:t>
+            </a:r>
+          </a:p>
+          <a:p>
+            <a:pPr marL="800100" lvl="1" indent="-342900" algn="just" defTabSz="914400">
+              <a:buFont typeface="+mj-lt"/>
+              <a:buAutoNum type="alphaLcParenR"/>
+            </a:pPr>
+            <a:r>
+              <a:rPr lang="es-ES_tradnl" dirty="0" smtClean="0"/>
+              <a:t>Confirmar cambios y subirlos.</a:t>
+            </a:r>
+          </a:p>
+          <a:p>
+            <a:pPr marL="800100" lvl="1" indent="-342900" algn="just" defTabSz="914400">
+              <a:buFont typeface="+mj-lt"/>
+              <a:buAutoNum type="alphaLcParenR"/>
+            </a:pPr>
+            <a:r>
+              <a:rPr lang="es-ES_tradnl" dirty="0" smtClean="0"/>
+              <a:t>Fusionar las ramas (administrador).</a:t>
+            </a:r>
+          </a:p>
+          <a:p>
+            <a:pPr marL="800100" lvl="1" indent="-342900" algn="just" defTabSz="914400">
+              <a:buFont typeface="+mj-lt"/>
+              <a:buAutoNum type="alphaLcParenR"/>
+            </a:pPr>
+            <a:r>
+              <a:rPr lang="es-ES_tradnl" dirty="0" smtClean="0"/>
+              <a:t>Visualizar versión actualizada en master.</a:t>
+            </a:r>
+            <a:endParaRPr lang="es-ES_tradnl" dirty="0"/>
+          </a:p>
+        </p:txBody>
+      </p:sp>
+      <p:sp>
+        <p:nvSpPr>
+          <p:cNvPr id="4" name="CuadroTexto 3"/>
+          <p:cNvSpPr txBox="1"/>
+          <p:nvPr/>
+        </p:nvSpPr>
+        <p:spPr>
+          <a:xfrm>
+            <a:off x="56876" y="6340526"/>
+            <a:ext cx="2902205" cy="369332"/>
+          </a:xfrm>
+          <a:prstGeom prst="rect">
+            <a:avLst/>
+          </a:prstGeom>
+          <a:solidFill>
+            <a:schemeClr val="tx2">
+              <a:lumMod val="75000"/>
+              <a:lumOff val="25000"/>
+            </a:schemeClr>
+          </a:solidFill>
+        </p:spPr>
+        <p:txBody>
+          <a:bodyPr wrap="none" rtlCol="0">
+            <a:spAutoFit/>
+          </a:bodyPr>
+          <a:lstStyle/>
+          <a:p>
+            <a:r>
+              <a:rPr lang="es-ES_tradnl" dirty="0" smtClean="0">
+                <a:solidFill>
+                  <a:schemeClr val="bg1"/>
+                </a:solidFill>
+              </a:rPr>
+              <a:t>Fuente: https</a:t>
+            </a:r>
+            <a:r>
+              <a:rPr lang="es-ES_tradnl" dirty="0">
+                <a:solidFill>
+                  <a:schemeClr val="bg1"/>
+                </a:solidFill>
+              </a:rPr>
+              <a:t>://</a:t>
+            </a:r>
+            <a:r>
+              <a:rPr lang="es-ES_tradnl" dirty="0" err="1">
+                <a:solidFill>
+                  <a:schemeClr val="bg1"/>
+                </a:solidFill>
+              </a:rPr>
+              <a:t>git-scm.com</a:t>
+            </a:r>
+            <a:r>
+              <a:rPr lang="es-ES_tradnl" dirty="0">
+                <a:solidFill>
+                  <a:schemeClr val="bg1"/>
+                </a:solidFill>
+              </a:rPr>
+              <a:t>/</a:t>
+            </a:r>
+          </a:p>
+        </p:txBody>
+      </p:sp>
+      <p:pic>
+        <p:nvPicPr>
+          <p:cNvPr id="3" name="Imagen 2"/>
+          <p:cNvPicPr>
+            <a:picLocks noChangeAspect="1"/>
+          </p:cNvPicPr>
+          <p:nvPr/>
+        </p:nvPicPr>
+        <p:blipFill>
+          <a:blip r:embed="rId2">
+            <a:extLst>
+              <a:ext uri="{28A0092B-C50C-407E-A947-70E740481C1C}">
+                <a14:useLocalDpi xmlns:a14="http://schemas.microsoft.com/office/drawing/2010/main" val="0"/>
+              </a:ext>
+            </a:extLst>
+          </a:blip>
+          <a:stretch>
+            <a:fillRect/>
+          </a:stretch>
+        </p:blipFill>
+        <p:spPr>
+          <a:xfrm>
+            <a:off x="3606084" y="4826318"/>
+            <a:ext cx="7585656" cy="1683952"/>
+          </a:xfrm>
+          <a:prstGeom prst="rect">
+            <a:avLst/>
+          </a:prstGeom>
+        </p:spPr>
+      </p:pic>
+    </p:spTree>
+    <p:extLst>
+      <p:ext uri="{BB962C8B-B14F-4D97-AF65-F5344CB8AC3E}">
+        <p14:creationId xmlns:p14="http://schemas.microsoft.com/office/powerpoint/2010/main" val="116525941"/>
+      </p:ext>
+    </p:extLst>
+  </p:cSld>
+  <p:clrMapOvr>
+    <a:masterClrMapping/>
+  </p:clrMapOvr>
+</p:sld>
+</file>
+
 <file path=ppt/slides/slide2.xml><?xml version="1.0" encoding="utf-8"?>
+<p:sld xmlns:a="http://schemas.openxmlformats.org/drawingml/2006/main" xmlns:r="http://schemas.openxmlformats.org/officeDocument/2006/relationships" xmlns:p="http://schemas.openxmlformats.org/presentationml/2006/main">
+  <p:cSld>
+    <p:spTree>
+      <p:nvGrpSpPr>
+        <p:cNvPr id="1" name=""/>
+        <p:cNvGrpSpPr/>
+        <p:nvPr/>
+      </p:nvGrpSpPr>
+      <p:grpSpPr>
+        <a:xfrm>
+          <a:off x="0" y="0"/>
+          <a:ext cx="0" cy="0"/>
+          <a:chOff x="0" y="0"/>
+          <a:chExt cx="0" cy="0"/>
+        </a:xfrm>
+      </p:grpSpPr>
+      <p:sp>
+        <p:nvSpPr>
+          <p:cNvPr id="2" name="Título 1"/>
+          <p:cNvSpPr>
+            <a:spLocks noGrp="1"/>
+          </p:cNvSpPr>
+          <p:nvPr>
+            <p:ph type="title"/>
+          </p:nvPr>
+        </p:nvSpPr>
+        <p:spPr/>
+        <p:txBody>
+          <a:bodyPr/>
+          <a:lstStyle/>
+          <a:p>
+            <a:r>
+              <a:rPr lang="es-ES_tradnl" dirty="0" smtClean="0"/>
+              <a:t>¿</a:t>
+            </a:r>
+            <a:r>
+              <a:rPr lang="es-ES_tradnl" dirty="0" err="1" smtClean="0"/>
+              <a:t>Qu</a:t>
+            </a:r>
+            <a:r>
+              <a:rPr lang="es-ES" dirty="0" smtClean="0"/>
+              <a:t>é es GIT?</a:t>
+            </a:r>
+            <a:endParaRPr lang="es-ES_tradnl" dirty="0"/>
+          </a:p>
+        </p:txBody>
+      </p:sp>
+      <p:sp>
+        <p:nvSpPr>
+          <p:cNvPr id="3" name="Marcador de contenido 2"/>
+          <p:cNvSpPr>
+            <a:spLocks noGrp="1"/>
+          </p:cNvSpPr>
+          <p:nvPr>
+            <p:ph idx="1"/>
+          </p:nvPr>
+        </p:nvSpPr>
+        <p:spPr/>
+        <p:txBody>
+          <a:bodyPr>
+            <a:normAutofit fontScale="85000" lnSpcReduction="20000"/>
+          </a:bodyPr>
+          <a:lstStyle/>
+          <a:p>
+            <a:r>
+              <a:rPr lang="es-ES_tradnl" dirty="0" err="1"/>
+              <a:t>Git</a:t>
+            </a:r>
+            <a:r>
+              <a:rPr lang="es-ES_tradnl" dirty="0"/>
+              <a:t> </a:t>
+            </a:r>
+            <a:r>
+              <a:rPr lang="es-ES_tradnl" dirty="0" smtClean="0"/>
+              <a:t> es un sistema de control de versiones distribuido free y open </a:t>
+            </a:r>
+            <a:r>
+              <a:rPr lang="es-ES_tradnl" dirty="0" err="1" smtClean="0"/>
+              <a:t>source</a:t>
+            </a:r>
+            <a:r>
+              <a:rPr lang="es-ES_tradnl" dirty="0" smtClean="0"/>
+              <a:t> diseñado para manejar desde proyectos pequeños a muy grandes con </a:t>
+            </a:r>
+            <a:r>
+              <a:rPr lang="es-ES_tradnl" dirty="0" err="1" smtClean="0"/>
+              <a:t>ra</a:t>
+            </a:r>
+            <a:r>
+              <a:rPr lang="es-ES" dirty="0" err="1" smtClean="0"/>
+              <a:t>pidez</a:t>
+            </a:r>
+            <a:r>
+              <a:rPr lang="es-ES_tradnl" dirty="0" smtClean="0"/>
+              <a:t> y eficiencia. </a:t>
+            </a:r>
+          </a:p>
+          <a:p>
+            <a:r>
+              <a:rPr lang="es-ES_tradnl" dirty="0" smtClean="0"/>
+              <a:t>Control de </a:t>
+            </a:r>
+            <a:r>
+              <a:rPr lang="es-ES_tradnl" dirty="0" err="1" smtClean="0"/>
+              <a:t>versi</a:t>
+            </a:r>
+            <a:r>
+              <a:rPr lang="es-ES" dirty="0" err="1"/>
+              <a:t>o</a:t>
+            </a:r>
+            <a:r>
+              <a:rPr lang="es-ES" dirty="0" err="1" smtClean="0"/>
+              <a:t>nes</a:t>
+            </a:r>
+            <a:r>
+              <a:rPr lang="es-ES" dirty="0" smtClean="0"/>
+              <a:t>: Es un sistema que registra cambios en un archivo o conjunto de archivos a lo largo del tiempo para que más adelante se pueda recuperar versiones especificas.</a:t>
+            </a:r>
+          </a:p>
+          <a:p>
+            <a:endParaRPr lang="es-ES_tradnl" dirty="0"/>
+          </a:p>
+          <a:p>
+            <a:r>
+              <a:rPr lang="es-ES_tradnl" dirty="0" err="1" smtClean="0"/>
+              <a:t>is</a:t>
+            </a:r>
+            <a:r>
+              <a:rPr lang="es-ES_tradnl" dirty="0" smtClean="0"/>
+              <a:t> </a:t>
+            </a:r>
+            <a:r>
+              <a:rPr lang="es-ES_tradnl" dirty="0"/>
+              <a:t>a free and </a:t>
+            </a:r>
+            <a:r>
+              <a:rPr lang="es-ES_tradnl" dirty="0" smtClean="0"/>
+              <a:t>open </a:t>
+            </a:r>
+            <a:r>
+              <a:rPr lang="es-ES_tradnl" dirty="0" err="1"/>
+              <a:t>source</a:t>
+            </a:r>
+            <a:r>
+              <a:rPr lang="es-ES_tradnl" dirty="0"/>
+              <a:t> </a:t>
+            </a:r>
+            <a:r>
+              <a:rPr lang="es-ES_tradnl" dirty="0" err="1"/>
+              <a:t>distributed</a:t>
+            </a:r>
+            <a:r>
+              <a:rPr lang="es-ES_tradnl" dirty="0"/>
+              <a:t> </a:t>
+            </a:r>
+            <a:r>
+              <a:rPr lang="es-ES_tradnl" dirty="0" err="1"/>
+              <a:t>version</a:t>
+            </a:r>
+            <a:r>
+              <a:rPr lang="es-ES_tradnl" dirty="0"/>
+              <a:t> control </a:t>
+            </a:r>
+            <a:r>
+              <a:rPr lang="es-ES_tradnl" dirty="0" err="1" smtClean="0"/>
+              <a:t>system</a:t>
+            </a:r>
+            <a:r>
+              <a:rPr lang="es-ES_tradnl" dirty="0"/>
+              <a:t> </a:t>
+            </a:r>
+            <a:r>
+              <a:rPr lang="es-ES_tradnl" dirty="0" err="1" smtClean="0"/>
+              <a:t>designed</a:t>
+            </a:r>
+            <a:r>
+              <a:rPr lang="es-ES_tradnl" dirty="0" smtClean="0"/>
+              <a:t> </a:t>
+            </a:r>
+            <a:r>
+              <a:rPr lang="es-ES_tradnl" dirty="0"/>
+              <a:t>to </a:t>
+            </a:r>
+            <a:r>
+              <a:rPr lang="es-ES_tradnl" dirty="0" err="1"/>
+              <a:t>handle</a:t>
+            </a:r>
+            <a:r>
+              <a:rPr lang="es-ES_tradnl" dirty="0"/>
+              <a:t> </a:t>
+            </a:r>
+            <a:r>
+              <a:rPr lang="es-ES_tradnl" dirty="0" err="1"/>
+              <a:t>everything</a:t>
+            </a:r>
+            <a:r>
+              <a:rPr lang="es-ES_tradnl" dirty="0"/>
+              <a:t> </a:t>
+            </a:r>
+            <a:r>
+              <a:rPr lang="es-ES_tradnl" dirty="0" err="1"/>
+              <a:t>from</a:t>
+            </a:r>
+            <a:r>
+              <a:rPr lang="es-ES_tradnl" dirty="0"/>
+              <a:t> </a:t>
+            </a:r>
+            <a:r>
+              <a:rPr lang="es-ES_tradnl" dirty="0" err="1"/>
+              <a:t>small</a:t>
+            </a:r>
+            <a:r>
+              <a:rPr lang="es-ES_tradnl" dirty="0"/>
+              <a:t> to </a:t>
+            </a:r>
+            <a:r>
+              <a:rPr lang="es-ES_tradnl" dirty="0" err="1"/>
+              <a:t>very</a:t>
+            </a:r>
+            <a:r>
+              <a:rPr lang="es-ES_tradnl" dirty="0"/>
+              <a:t> </a:t>
+            </a:r>
+            <a:r>
+              <a:rPr lang="es-ES_tradnl" dirty="0" err="1"/>
+              <a:t>large</a:t>
+            </a:r>
+            <a:r>
+              <a:rPr lang="es-ES_tradnl" dirty="0"/>
+              <a:t> </a:t>
+            </a:r>
+            <a:r>
+              <a:rPr lang="es-ES_tradnl" dirty="0" err="1"/>
+              <a:t>projects</a:t>
+            </a:r>
+            <a:r>
+              <a:rPr lang="es-ES_tradnl" dirty="0"/>
+              <a:t> </a:t>
+            </a:r>
+            <a:r>
+              <a:rPr lang="es-ES_tradnl" dirty="0" err="1"/>
+              <a:t>with</a:t>
+            </a:r>
+            <a:r>
+              <a:rPr lang="es-ES_tradnl" dirty="0"/>
+              <a:t> </a:t>
+            </a:r>
+            <a:r>
+              <a:rPr lang="es-ES_tradnl" dirty="0" err="1"/>
+              <a:t>speed</a:t>
+            </a:r>
+            <a:r>
+              <a:rPr lang="es-ES_tradnl" dirty="0"/>
+              <a:t> and </a:t>
+            </a:r>
+            <a:r>
+              <a:rPr lang="es-ES_tradnl" dirty="0" err="1"/>
+              <a:t>efficiency</a:t>
+            </a:r>
+            <a:r>
+              <a:rPr lang="es-ES_tradnl" dirty="0" smtClean="0"/>
+              <a:t>.</a:t>
+            </a:r>
+            <a:endParaRPr lang="es-ES_tradnl" dirty="0"/>
+          </a:p>
+          <a:p>
+            <a:r>
+              <a:rPr lang="es-ES_tradnl" dirty="0" err="1" smtClean="0"/>
+              <a:t>Version</a:t>
+            </a:r>
+            <a:r>
+              <a:rPr lang="es-ES_tradnl" dirty="0" smtClean="0"/>
+              <a:t> control</a:t>
+            </a:r>
+            <a:r>
+              <a:rPr lang="es-ES_tradnl" dirty="0"/>
+              <a:t>:</a:t>
+            </a:r>
+            <a:r>
+              <a:rPr lang="es-ES_tradnl" dirty="0" smtClean="0"/>
+              <a:t> </a:t>
+            </a:r>
+            <a:r>
+              <a:rPr lang="es-ES_tradnl" dirty="0" err="1"/>
+              <a:t>is</a:t>
+            </a:r>
+            <a:r>
+              <a:rPr lang="es-ES_tradnl" dirty="0"/>
+              <a:t> a </a:t>
+            </a:r>
+            <a:r>
+              <a:rPr lang="es-ES_tradnl" dirty="0" err="1"/>
+              <a:t>system</a:t>
+            </a:r>
+            <a:r>
+              <a:rPr lang="es-ES_tradnl" dirty="0"/>
+              <a:t> </a:t>
+            </a:r>
+            <a:r>
+              <a:rPr lang="es-ES_tradnl" dirty="0" err="1"/>
+              <a:t>that</a:t>
+            </a:r>
+            <a:r>
+              <a:rPr lang="es-ES_tradnl" dirty="0"/>
+              <a:t> records </a:t>
+            </a:r>
+            <a:r>
+              <a:rPr lang="es-ES_tradnl" dirty="0" err="1"/>
+              <a:t>changes</a:t>
+            </a:r>
+            <a:r>
+              <a:rPr lang="es-ES_tradnl" dirty="0"/>
+              <a:t> to a file </a:t>
+            </a:r>
+            <a:r>
+              <a:rPr lang="es-ES_tradnl" dirty="0" err="1"/>
+              <a:t>or</a:t>
+            </a:r>
+            <a:r>
+              <a:rPr lang="es-ES_tradnl" dirty="0"/>
+              <a:t> set of files </a:t>
+            </a:r>
+            <a:r>
+              <a:rPr lang="es-ES_tradnl" dirty="0" err="1"/>
+              <a:t>over</a:t>
+            </a:r>
+            <a:r>
+              <a:rPr lang="es-ES_tradnl" dirty="0"/>
+              <a:t> time so </a:t>
+            </a:r>
+            <a:r>
+              <a:rPr lang="es-ES_tradnl" dirty="0" err="1"/>
+              <a:t>that</a:t>
+            </a:r>
+            <a:r>
+              <a:rPr lang="es-ES_tradnl" dirty="0"/>
+              <a:t> </a:t>
+            </a:r>
+            <a:r>
+              <a:rPr lang="es-ES_tradnl" dirty="0" err="1"/>
+              <a:t>you</a:t>
+            </a:r>
+            <a:r>
+              <a:rPr lang="es-ES_tradnl" dirty="0"/>
+              <a:t> can </a:t>
+            </a:r>
+            <a:r>
+              <a:rPr lang="es-ES_tradnl" dirty="0" err="1"/>
+              <a:t>recall</a:t>
+            </a:r>
+            <a:r>
+              <a:rPr lang="es-ES_tradnl" dirty="0"/>
+              <a:t> </a:t>
+            </a:r>
+            <a:r>
+              <a:rPr lang="es-ES_tradnl" dirty="0" err="1"/>
+              <a:t>specific</a:t>
+            </a:r>
+            <a:r>
+              <a:rPr lang="es-ES_tradnl" dirty="0"/>
+              <a:t> </a:t>
+            </a:r>
+            <a:r>
+              <a:rPr lang="es-ES_tradnl" dirty="0" err="1"/>
+              <a:t>versions</a:t>
+            </a:r>
+            <a:r>
+              <a:rPr lang="es-ES_tradnl" dirty="0"/>
+              <a:t> </a:t>
+            </a:r>
+            <a:r>
+              <a:rPr lang="es-ES_tradnl" dirty="0" err="1" smtClean="0"/>
+              <a:t>later</a:t>
+            </a:r>
+            <a:endParaRPr lang="es-ES_tradnl" dirty="0"/>
+          </a:p>
+        </p:txBody>
+      </p:sp>
+    </p:spTree>
+    <p:extLst>
+      <p:ext uri="{BB962C8B-B14F-4D97-AF65-F5344CB8AC3E}">
+        <p14:creationId xmlns:p14="http://schemas.microsoft.com/office/powerpoint/2010/main" val="422520315"/>
+      </p:ext>
+    </p:extLst>
+  </p:cSld>
+  <p:clrMapOvr>
+    <a:masterClrMapping/>
+  </p:clrMapOvr>
+</p:sld>
+</file>
+
+<file path=ppt/slides/slide3.xml><?xml version="1.0" encoding="utf-8"?>
 <p:sld xmlns:a="http://schemas.openxmlformats.org/drawingml/2006/main" xmlns:r="http://schemas.openxmlformats.org/officeDocument/2006/relationships" xmlns:p="http://schemas.openxmlformats.org/presentationml/2006/main">
   <p:cSld>
     <p:spTree>
@@ -7401,7 +8852,7 @@
 </p:sld>
 </file>
 
-<file path=ppt/slides/slide3.xml><?xml version="1.0" encoding="utf-8"?>
+<file path=ppt/slides/slide4.xml><?xml version="1.0" encoding="utf-8"?>
 <p:sld xmlns:a="http://schemas.openxmlformats.org/drawingml/2006/main" xmlns:r="http://schemas.openxmlformats.org/officeDocument/2006/relationships" xmlns:p="http://schemas.openxmlformats.org/presentationml/2006/main">
   <p:cSld>
     <p:spTree>
@@ -7442,7 +8893,7 @@
           <a:p>
             <a:r>
               <a:rPr lang="es-ES_tradnl" dirty="0" smtClean="0"/>
-              <a:t>Historia de GIT (DVCS)</a:t>
+              <a:t>Un poco de historia (Esquema)</a:t>
             </a:r>
             <a:endParaRPr lang="es-ES_tradnl" dirty="0"/>
           </a:p>
@@ -7466,7 +8917,7 @@
         </p:spPr>
         <p:txBody>
           <a:bodyPr>
-            <a:normAutofit fontScale="85000" lnSpcReduction="10000"/>
+            <a:normAutofit/>
           </a:bodyPr>
           <a:lstStyle/>
           <a:p>
@@ -7527,46 +8978,7 @@
             </a:r>
             <a:r>
               <a:rPr lang="es-ES_tradnl" dirty="0" smtClean="0"/>
-              <a:t>a desarrollar GIT. Con objetivos como:</a:t>
-            </a:r>
-          </a:p>
-          <a:p>
-            <a:pPr lvl="1" algn="just"/>
-            <a:r>
-              <a:rPr lang="es-ES_tradnl" dirty="0" smtClean="0"/>
-              <a:t>Velocidad</a:t>
-            </a:r>
-            <a:endParaRPr lang="es-ES_tradnl" dirty="0"/>
-          </a:p>
-          <a:p>
-            <a:pPr lvl="1" algn="just"/>
-            <a:r>
-              <a:rPr lang="es-ES_tradnl" dirty="0" smtClean="0"/>
-              <a:t>Diseño sencillo</a:t>
-            </a:r>
-            <a:endParaRPr lang="es-ES_tradnl" dirty="0"/>
-          </a:p>
-          <a:p>
-            <a:pPr lvl="1" algn="just"/>
-            <a:r>
-              <a:rPr lang="es-ES_tradnl" dirty="0" smtClean="0"/>
-              <a:t>Fuerte apoyo en el desarrollo no lineal (ramas paralelas)</a:t>
-            </a:r>
-            <a:endParaRPr lang="es-ES_tradnl" dirty="0"/>
-          </a:p>
-          <a:p>
-            <a:pPr lvl="1" algn="just"/>
-            <a:r>
-              <a:rPr lang="es-ES_tradnl" dirty="0" smtClean="0"/>
-              <a:t>Completamente distribuido</a:t>
-            </a:r>
-            <a:endParaRPr lang="es-ES_tradnl" dirty="0"/>
-          </a:p>
-          <a:p>
-            <a:pPr lvl="1" algn="just"/>
-            <a:r>
-              <a:rPr lang="es-ES_tradnl" dirty="0" smtClean="0"/>
-              <a:t>Capacidad de manejar grandes proyectos (tamaño de datos)</a:t>
+              <a:t>a desarrollar GIT. </a:t>
             </a:r>
           </a:p>
           <a:p>
@@ -7657,7 +9069,899 @@
 </p:sld>
 </file>
 
-<file path=ppt/slides/slide4.xml><?xml version="1.0" encoding="utf-8"?>
+<file path=ppt/slides/slide5.xml><?xml version="1.0" encoding="utf-8"?>
+<p:sld xmlns:a="http://schemas.openxmlformats.org/drawingml/2006/main" xmlns:r="http://schemas.openxmlformats.org/officeDocument/2006/relationships" xmlns:p="http://schemas.openxmlformats.org/presentationml/2006/main">
+  <p:cSld>
+    <p:spTree>
+      <p:nvGrpSpPr>
+        <p:cNvPr id="1" name=""/>
+        <p:cNvGrpSpPr/>
+        <p:nvPr/>
+      </p:nvGrpSpPr>
+      <p:grpSpPr>
+        <a:xfrm>
+          <a:off x="0" y="0"/>
+          <a:ext cx="0" cy="0"/>
+          <a:chOff x="0" y="0"/>
+          <a:chExt cx="0" cy="0"/>
+        </a:xfrm>
+      </p:grpSpPr>
+      <p:sp>
+        <p:nvSpPr>
+          <p:cNvPr id="4" name="Título 1"/>
+          <p:cNvSpPr>
+            <a:spLocks noGrp="1"/>
+          </p:cNvSpPr>
+          <p:nvPr>
+            <p:ph type="title"/>
+          </p:nvPr>
+        </p:nvSpPr>
+        <p:spPr>
+          <a:xfrm>
+            <a:off x="1484310" y="117389"/>
+            <a:ext cx="10018713" cy="673443"/>
+          </a:xfrm>
+        </p:spPr>
+        <p:txBody>
+          <a:bodyPr>
+            <a:normAutofit fontScale="90000"/>
+          </a:bodyPr>
+          <a:lstStyle/>
+          <a:p>
+            <a:r>
+              <a:rPr lang="es-ES_tradnl" dirty="0" smtClean="0"/>
+              <a:t>Un poco de historia (Esquema)</a:t>
+            </a:r>
+            <a:endParaRPr lang="es-ES_tradnl" dirty="0"/>
+          </a:p>
+        </p:txBody>
+      </p:sp>
+      <p:pic>
+        <p:nvPicPr>
+          <p:cNvPr id="6" name="Imagen 5"/>
+          <p:cNvPicPr>
+            <a:picLocks noChangeAspect="1"/>
+          </p:cNvPicPr>
+          <p:nvPr/>
+        </p:nvPicPr>
+        <p:blipFill>
+          <a:blip r:embed="rId2">
+            <a:extLst>
+              <a:ext uri="{28A0092B-C50C-407E-A947-70E740481C1C}">
+                <a14:useLocalDpi xmlns:a14="http://schemas.microsoft.com/office/drawing/2010/main" val="0"/>
+              </a:ext>
+            </a:extLst>
+          </a:blip>
+          <a:stretch>
+            <a:fillRect/>
+          </a:stretch>
+        </p:blipFill>
+        <p:spPr>
+          <a:xfrm>
+            <a:off x="1031946" y="454110"/>
+            <a:ext cx="2514600" cy="2883408"/>
+          </a:xfrm>
+          <a:prstGeom prst="rect">
+            <a:avLst/>
+          </a:prstGeom>
+        </p:spPr>
+      </p:pic>
+      <p:pic>
+        <p:nvPicPr>
+          <p:cNvPr id="7" name="Imagen 6"/>
+          <p:cNvPicPr>
+            <a:picLocks noChangeAspect="1"/>
+          </p:cNvPicPr>
+          <p:nvPr/>
+        </p:nvPicPr>
+        <p:blipFill>
+          <a:blip r:embed="rId3">
+            <a:extLst>
+              <a:ext uri="{28A0092B-C50C-407E-A947-70E740481C1C}">
+                <a14:useLocalDpi xmlns:a14="http://schemas.microsoft.com/office/drawing/2010/main" val="0"/>
+              </a:ext>
+            </a:extLst>
+          </a:blip>
+          <a:stretch>
+            <a:fillRect/>
+          </a:stretch>
+        </p:blipFill>
+        <p:spPr>
+          <a:xfrm>
+            <a:off x="1149418" y="4318510"/>
+            <a:ext cx="2857500" cy="1276350"/>
+          </a:xfrm>
+          <a:prstGeom prst="rect">
+            <a:avLst/>
+          </a:prstGeom>
+        </p:spPr>
+      </p:pic>
+      <p:pic>
+        <p:nvPicPr>
+          <p:cNvPr id="8" name="Imagen 7"/>
+          <p:cNvPicPr>
+            <a:picLocks noChangeAspect="1"/>
+          </p:cNvPicPr>
+          <p:nvPr/>
+        </p:nvPicPr>
+        <p:blipFill>
+          <a:blip r:embed="rId4">
+            <a:extLst>
+              <a:ext uri="{28A0092B-C50C-407E-A947-70E740481C1C}">
+                <a14:useLocalDpi xmlns:a14="http://schemas.microsoft.com/office/drawing/2010/main" val="0"/>
+              </a:ext>
+            </a:extLst>
+          </a:blip>
+          <a:stretch>
+            <a:fillRect/>
+          </a:stretch>
+        </p:blipFill>
+        <p:spPr>
+          <a:xfrm>
+            <a:off x="4143409" y="2870710"/>
+            <a:ext cx="3467100" cy="1447800"/>
+          </a:xfrm>
+          <a:prstGeom prst="rect">
+            <a:avLst/>
+          </a:prstGeom>
+        </p:spPr>
+      </p:pic>
+      <p:pic>
+        <p:nvPicPr>
+          <p:cNvPr id="9" name="Imagen 8"/>
+          <p:cNvPicPr>
+            <a:picLocks noChangeAspect="1"/>
+          </p:cNvPicPr>
+          <p:nvPr/>
+        </p:nvPicPr>
+        <p:blipFill>
+          <a:blip r:embed="rId5">
+            <a:extLst>
+              <a:ext uri="{28A0092B-C50C-407E-A947-70E740481C1C}">
+                <a14:useLocalDpi xmlns:a14="http://schemas.microsoft.com/office/drawing/2010/main" val="0"/>
+              </a:ext>
+            </a:extLst>
+          </a:blip>
+          <a:stretch>
+            <a:fillRect/>
+          </a:stretch>
+        </p:blipFill>
+        <p:spPr>
+          <a:xfrm>
+            <a:off x="7747000" y="3151698"/>
+            <a:ext cx="4445000" cy="2333625"/>
+          </a:xfrm>
+          <a:prstGeom prst="rect">
+            <a:avLst/>
+          </a:prstGeom>
+        </p:spPr>
+      </p:pic>
+      <p:pic>
+        <p:nvPicPr>
+          <p:cNvPr id="11" name="Imagen 10"/>
+          <p:cNvPicPr>
+            <a:picLocks noChangeAspect="1"/>
+          </p:cNvPicPr>
+          <p:nvPr/>
+        </p:nvPicPr>
+        <p:blipFill>
+          <a:blip r:embed="rId6">
+            <a:extLst>
+              <a:ext uri="{28A0092B-C50C-407E-A947-70E740481C1C}">
+                <a14:useLocalDpi xmlns:a14="http://schemas.microsoft.com/office/drawing/2010/main" val="0"/>
+              </a:ext>
+            </a:extLst>
+          </a:blip>
+          <a:stretch>
+            <a:fillRect/>
+          </a:stretch>
+        </p:blipFill>
+        <p:spPr>
+          <a:xfrm>
+            <a:off x="8455023" y="1497669"/>
+            <a:ext cx="3048000" cy="796290"/>
+          </a:xfrm>
+          <a:prstGeom prst="rect">
+            <a:avLst/>
+          </a:prstGeom>
+        </p:spPr>
+      </p:pic>
+    </p:spTree>
+    <p:extLst>
+      <p:ext uri="{BB962C8B-B14F-4D97-AF65-F5344CB8AC3E}">
+        <p14:creationId xmlns:p14="http://schemas.microsoft.com/office/powerpoint/2010/main" val="1690099718"/>
+      </p:ext>
+    </p:extLst>
+  </p:cSld>
+  <p:clrMapOvr>
+    <a:masterClrMapping/>
+  </p:clrMapOvr>
+</p:sld>
+</file>
+
+<file path=ppt/slides/slide6.xml><?xml version="1.0" encoding="utf-8"?>
+<p:sld xmlns:a="http://schemas.openxmlformats.org/drawingml/2006/main" xmlns:r="http://schemas.openxmlformats.org/officeDocument/2006/relationships" xmlns:p="http://schemas.openxmlformats.org/presentationml/2006/main">
+  <p:cSld>
+    <p:spTree>
+      <p:nvGrpSpPr>
+        <p:cNvPr id="1" name=""/>
+        <p:cNvGrpSpPr/>
+        <p:nvPr/>
+      </p:nvGrpSpPr>
+      <p:grpSpPr>
+        <a:xfrm>
+          <a:off x="0" y="0"/>
+          <a:ext cx="0" cy="0"/>
+          <a:chOff x="0" y="0"/>
+          <a:chExt cx="0" cy="0"/>
+        </a:xfrm>
+      </p:grpSpPr>
+      <p:sp>
+        <p:nvSpPr>
+          <p:cNvPr id="2" name="Título 1"/>
+          <p:cNvSpPr>
+            <a:spLocks noGrp="1"/>
+          </p:cNvSpPr>
+          <p:nvPr>
+            <p:ph type="title"/>
+          </p:nvPr>
+        </p:nvSpPr>
+        <p:spPr/>
+        <p:txBody>
+          <a:bodyPr/>
+          <a:lstStyle/>
+          <a:p>
+            <a:r>
+              <a:rPr lang="es-ES_tradnl" dirty="0" smtClean="0"/>
+              <a:t>Carácter</a:t>
+            </a:r>
+            <a:r>
+              <a:rPr lang="es-ES" dirty="0" err="1" smtClean="0"/>
+              <a:t>ísticas</a:t>
+            </a:r>
+            <a:r>
+              <a:rPr lang="es-ES" dirty="0" smtClean="0"/>
+              <a:t> de </a:t>
+            </a:r>
+            <a:r>
+              <a:rPr lang="es-ES" dirty="0" err="1" smtClean="0"/>
+              <a:t>Git</a:t>
+            </a:r>
+            <a:endParaRPr lang="es-ES_tradnl" dirty="0"/>
+          </a:p>
+        </p:txBody>
+      </p:sp>
+      <p:sp>
+        <p:nvSpPr>
+          <p:cNvPr id="3" name="Marcador de contenido 2"/>
+          <p:cNvSpPr>
+            <a:spLocks noGrp="1"/>
+          </p:cNvSpPr>
+          <p:nvPr>
+            <p:ph idx="1"/>
+          </p:nvPr>
+        </p:nvSpPr>
+        <p:spPr/>
+        <p:txBody>
+          <a:bodyPr/>
+          <a:lstStyle/>
+          <a:p>
+            <a:pPr algn="just"/>
+            <a:r>
+              <a:rPr lang="es-ES_tradnl" dirty="0" smtClean="0"/>
+              <a:t>Rapidez</a:t>
+            </a:r>
+            <a:endParaRPr lang="es-ES_tradnl" dirty="0" smtClean="0"/>
+          </a:p>
+          <a:p>
+            <a:pPr algn="just"/>
+            <a:r>
+              <a:rPr lang="es-ES_tradnl" dirty="0"/>
+              <a:t>Completamente </a:t>
+            </a:r>
+            <a:r>
+              <a:rPr lang="es-ES_tradnl" dirty="0" smtClean="0"/>
+              <a:t>distribuido</a:t>
+            </a:r>
+            <a:endParaRPr lang="es-ES_tradnl" dirty="0"/>
+          </a:p>
+          <a:p>
+            <a:pPr algn="just"/>
+            <a:r>
+              <a:rPr lang="es-ES_tradnl" dirty="0"/>
+              <a:t>Diseño sencillo</a:t>
+            </a:r>
+          </a:p>
+          <a:p>
+            <a:pPr algn="just"/>
+            <a:r>
+              <a:rPr lang="es-ES_tradnl" dirty="0"/>
+              <a:t>Fuerte apoyo en el desarrollo no lineal </a:t>
+            </a:r>
+            <a:r>
+              <a:rPr lang="es-ES_tradnl" dirty="0" smtClean="0"/>
+              <a:t>(</a:t>
+            </a:r>
+            <a:r>
+              <a:rPr lang="es-ES_tradnl" dirty="0" err="1"/>
+              <a:t>thousands</a:t>
+            </a:r>
+            <a:r>
+              <a:rPr lang="es-ES_tradnl" dirty="0"/>
+              <a:t> of </a:t>
+            </a:r>
+            <a:r>
+              <a:rPr lang="es-ES_tradnl" dirty="0" err="1"/>
+              <a:t>parallel</a:t>
+            </a:r>
+            <a:r>
+              <a:rPr lang="es-ES_tradnl" dirty="0"/>
+              <a:t> </a:t>
+            </a:r>
+            <a:r>
+              <a:rPr lang="es-ES_tradnl" dirty="0" err="1"/>
+              <a:t>branches</a:t>
+            </a:r>
+            <a:r>
+              <a:rPr lang="es-ES_tradnl" dirty="0" smtClean="0"/>
+              <a:t>)</a:t>
+            </a:r>
+            <a:endParaRPr lang="es-ES_tradnl" dirty="0"/>
+          </a:p>
+          <a:p>
+            <a:pPr algn="just"/>
+            <a:r>
+              <a:rPr lang="es-ES_tradnl" dirty="0" smtClean="0"/>
+              <a:t>Capacidad </a:t>
+            </a:r>
+            <a:r>
+              <a:rPr lang="es-ES_tradnl" dirty="0"/>
+              <a:t>de manejar grandes proyectos (tamaño de datos)</a:t>
+            </a:r>
+          </a:p>
+          <a:p>
+            <a:endParaRPr lang="es-ES_tradnl" dirty="0"/>
+          </a:p>
+        </p:txBody>
+      </p:sp>
+    </p:spTree>
+    <p:extLst>
+      <p:ext uri="{BB962C8B-B14F-4D97-AF65-F5344CB8AC3E}">
+        <p14:creationId xmlns:p14="http://schemas.microsoft.com/office/powerpoint/2010/main" val="671350469"/>
+      </p:ext>
+    </p:extLst>
+  </p:cSld>
+  <p:clrMapOvr>
+    <a:masterClrMapping/>
+  </p:clrMapOvr>
+</p:sld>
+</file>
+
+<file path=ppt/slides/slide7.xml><?xml version="1.0" encoding="utf-8"?>
+<p:sld xmlns:a="http://schemas.openxmlformats.org/drawingml/2006/main" xmlns:r="http://schemas.openxmlformats.org/officeDocument/2006/relationships" xmlns:p="http://schemas.openxmlformats.org/presentationml/2006/main">
+  <p:cSld>
+    <p:spTree>
+      <p:nvGrpSpPr>
+        <p:cNvPr id="1" name=""/>
+        <p:cNvGrpSpPr/>
+        <p:nvPr/>
+      </p:nvGrpSpPr>
+      <p:grpSpPr>
+        <a:xfrm>
+          <a:off x="0" y="0"/>
+          <a:ext cx="0" cy="0"/>
+          <a:chOff x="0" y="0"/>
+          <a:chExt cx="0" cy="0"/>
+        </a:xfrm>
+      </p:grpSpPr>
+      <p:sp>
+        <p:nvSpPr>
+          <p:cNvPr id="2" name="Título 1"/>
+          <p:cNvSpPr>
+            <a:spLocks noGrp="1"/>
+          </p:cNvSpPr>
+          <p:nvPr>
+            <p:ph type="title"/>
+          </p:nvPr>
+        </p:nvSpPr>
+        <p:spPr/>
+        <p:txBody>
+          <a:bodyPr/>
+          <a:lstStyle/>
+          <a:p>
+            <a:r>
+              <a:rPr lang="es-ES_tradnl" dirty="0" smtClean="0"/>
+              <a:t>Herramientas</a:t>
+            </a:r>
+            <a:endParaRPr lang="es-ES_tradnl" dirty="0"/>
+          </a:p>
+        </p:txBody>
+      </p:sp>
+      <p:sp>
+        <p:nvSpPr>
+          <p:cNvPr id="3" name="Marcador de contenido 2"/>
+          <p:cNvSpPr>
+            <a:spLocks noGrp="1"/>
+          </p:cNvSpPr>
+          <p:nvPr>
+            <p:ph idx="1"/>
+          </p:nvPr>
+        </p:nvSpPr>
+        <p:spPr/>
+        <p:txBody>
+          <a:bodyPr>
+            <a:normAutofit fontScale="55000" lnSpcReduction="20000"/>
+          </a:bodyPr>
+          <a:lstStyle/>
+          <a:p>
+            <a:r>
+              <a:rPr lang="es-ES_tradnl" dirty="0"/>
+              <a:t>Se recomienda </a:t>
+            </a:r>
+            <a:r>
+              <a:rPr lang="es-ES_tradnl" dirty="0" smtClean="0"/>
+              <a:t>utilizar repositorios remotos :</a:t>
+            </a:r>
+            <a:endParaRPr lang="es-ES_tradnl" dirty="0" smtClean="0"/>
+          </a:p>
+          <a:p>
+            <a:pPr lvl="1"/>
+            <a:r>
+              <a:rPr lang="es-ES_tradnl" dirty="0" smtClean="0">
+                <a:hlinkClick r:id="rId2"/>
+              </a:rPr>
+              <a:t>https</a:t>
+            </a:r>
+            <a:r>
+              <a:rPr lang="es-ES_tradnl" dirty="0">
+                <a:hlinkClick r:id="rId2"/>
+              </a:rPr>
+              <a:t>://</a:t>
+            </a:r>
+            <a:r>
+              <a:rPr lang="es-ES_tradnl" dirty="0" smtClean="0">
+                <a:hlinkClick r:id="rId2"/>
+              </a:rPr>
+              <a:t>github.com</a:t>
+            </a:r>
+            <a:endParaRPr lang="es-ES_tradnl" dirty="0">
+              <a:hlinkClick r:id="rId2"/>
+            </a:endParaRPr>
+          </a:p>
+          <a:p>
+            <a:pPr lvl="1"/>
+            <a:r>
+              <a:rPr lang="es-ES_tradnl" dirty="0" smtClean="0">
+                <a:hlinkClick r:id="rId3"/>
+              </a:rPr>
+              <a:t>https</a:t>
+            </a:r>
+            <a:r>
+              <a:rPr lang="es-ES_tradnl" dirty="0">
+                <a:hlinkClick r:id="rId3"/>
+              </a:rPr>
+              <a:t>://</a:t>
+            </a:r>
+            <a:r>
+              <a:rPr lang="es-ES_tradnl" dirty="0" smtClean="0">
+                <a:hlinkClick r:id="rId3"/>
+              </a:rPr>
+              <a:t>bitbucket.org</a:t>
+            </a:r>
+            <a:endParaRPr lang="es-ES_tradnl" dirty="0">
+              <a:hlinkClick r:id="rId3"/>
+            </a:endParaRPr>
+          </a:p>
+          <a:p>
+            <a:pPr lvl="1"/>
+            <a:r>
+              <a:rPr lang="es-ES_tradnl" dirty="0" smtClean="0">
+                <a:hlinkClick r:id="rId4"/>
+              </a:rPr>
+              <a:t>https</a:t>
+            </a:r>
+            <a:r>
+              <a:rPr lang="es-ES_tradnl" dirty="0">
+                <a:hlinkClick r:id="rId4"/>
+              </a:rPr>
+              <a:t>://about.gitlab.com</a:t>
+            </a:r>
+            <a:r>
+              <a:rPr lang="es-ES_tradnl" dirty="0" smtClean="0">
+                <a:hlinkClick r:id="rId4"/>
+              </a:rPr>
+              <a:t>/</a:t>
+            </a:r>
+            <a:endParaRPr lang="es-ES_tradnl" dirty="0">
+              <a:hlinkClick r:id="rId4"/>
+            </a:endParaRPr>
+          </a:p>
+          <a:p>
+            <a:pPr lvl="1"/>
+            <a:r>
+              <a:rPr lang="es-ES_tradnl" dirty="0" smtClean="0">
+                <a:hlinkClick r:id="rId5"/>
+              </a:rPr>
+              <a:t>https</a:t>
+            </a:r>
+            <a:r>
+              <a:rPr lang="es-ES_tradnl" dirty="0">
+                <a:hlinkClick r:id="rId5"/>
+              </a:rPr>
+              <a:t>://gogs.io</a:t>
+            </a:r>
+            <a:r>
+              <a:rPr lang="es-ES_tradnl" dirty="0" smtClean="0">
+                <a:hlinkClick r:id="rId5"/>
+              </a:rPr>
+              <a:t>/ </a:t>
+            </a:r>
+            <a:r>
+              <a:rPr lang="es-ES_tradnl" dirty="0">
+                <a:hlinkClick r:id="rId5"/>
+              </a:rPr>
+              <a:t>(A painless self-hosted Git service.)</a:t>
+            </a:r>
+          </a:p>
+          <a:p>
+            <a:endParaRPr lang="es-ES_tradnl" dirty="0" smtClean="0"/>
+          </a:p>
+          <a:p>
+            <a:r>
+              <a:rPr lang="es-ES_tradnl" dirty="0"/>
+              <a:t>GUI </a:t>
+            </a:r>
+            <a:r>
+              <a:rPr lang="es-ES_tradnl" dirty="0" err="1" smtClean="0"/>
+              <a:t>Clients</a:t>
+            </a:r>
+            <a:endParaRPr lang="es-ES_tradnl" dirty="0"/>
+          </a:p>
+          <a:p>
+            <a:pPr lvl="1"/>
+            <a:r>
+              <a:rPr lang="es-ES_tradnl" dirty="0" err="1"/>
+              <a:t>Git</a:t>
+            </a:r>
+            <a:r>
+              <a:rPr lang="es-ES_tradnl" dirty="0"/>
+              <a:t> comes </a:t>
+            </a:r>
+            <a:r>
+              <a:rPr lang="es-ES_tradnl" dirty="0" err="1"/>
+              <a:t>with</a:t>
+            </a:r>
+            <a:r>
+              <a:rPr lang="es-ES_tradnl" dirty="0"/>
+              <a:t> </a:t>
+            </a:r>
+            <a:r>
+              <a:rPr lang="es-ES_tradnl" dirty="0" err="1"/>
+              <a:t>built</a:t>
+            </a:r>
+            <a:r>
+              <a:rPr lang="es-ES_tradnl" dirty="0"/>
+              <a:t>-in GUI </a:t>
+            </a:r>
+            <a:r>
+              <a:rPr lang="es-ES_tradnl" dirty="0" err="1"/>
+              <a:t>tools</a:t>
+            </a:r>
+            <a:r>
+              <a:rPr lang="es-ES_tradnl" dirty="0"/>
+              <a:t> </a:t>
+            </a:r>
+            <a:r>
+              <a:rPr lang="es-ES_tradnl" dirty="0" err="1"/>
+              <a:t>for</a:t>
+            </a:r>
+            <a:r>
+              <a:rPr lang="es-ES_tradnl" dirty="0"/>
+              <a:t> </a:t>
+            </a:r>
+            <a:r>
+              <a:rPr lang="es-ES_tradnl" dirty="0" err="1"/>
+              <a:t>committing</a:t>
+            </a:r>
+            <a:r>
+              <a:rPr lang="es-ES_tradnl" dirty="0"/>
+              <a:t> (</a:t>
+            </a:r>
+            <a:r>
+              <a:rPr lang="es-ES_tradnl" dirty="0" err="1"/>
+              <a:t>git-gui</a:t>
+            </a:r>
+            <a:r>
+              <a:rPr lang="es-ES_tradnl" dirty="0"/>
+              <a:t>) and </a:t>
+            </a:r>
+            <a:r>
+              <a:rPr lang="es-ES_tradnl" dirty="0" err="1"/>
+              <a:t>browsing</a:t>
+            </a:r>
+            <a:r>
+              <a:rPr lang="es-ES_tradnl" dirty="0"/>
+              <a:t> (</a:t>
+            </a:r>
+            <a:r>
+              <a:rPr lang="es-ES_tradnl" dirty="0" err="1"/>
+              <a:t>gitk</a:t>
+            </a:r>
+            <a:r>
+              <a:rPr lang="es-ES_tradnl" dirty="0"/>
+              <a:t>), </a:t>
+            </a:r>
+            <a:r>
+              <a:rPr lang="es-ES_tradnl" dirty="0" err="1"/>
+              <a:t>but</a:t>
+            </a:r>
+            <a:r>
+              <a:rPr lang="es-ES_tradnl" dirty="0"/>
+              <a:t> </a:t>
+            </a:r>
+            <a:r>
+              <a:rPr lang="es-ES_tradnl" dirty="0" err="1"/>
+              <a:t>there</a:t>
+            </a:r>
+            <a:r>
+              <a:rPr lang="es-ES_tradnl" dirty="0"/>
+              <a:t> are </a:t>
+            </a:r>
+            <a:r>
+              <a:rPr lang="es-ES_tradnl" dirty="0" err="1"/>
+              <a:t>several</a:t>
+            </a:r>
+            <a:r>
+              <a:rPr lang="es-ES_tradnl" dirty="0"/>
+              <a:t> </a:t>
+            </a:r>
+            <a:r>
+              <a:rPr lang="es-ES_tradnl" dirty="0" err="1"/>
+              <a:t>third-party</a:t>
+            </a:r>
+            <a:r>
+              <a:rPr lang="es-ES_tradnl" dirty="0"/>
+              <a:t> </a:t>
+            </a:r>
+            <a:r>
+              <a:rPr lang="es-ES_tradnl" dirty="0" err="1"/>
+              <a:t>tools</a:t>
+            </a:r>
+            <a:r>
+              <a:rPr lang="es-ES_tradnl" dirty="0"/>
+              <a:t> </a:t>
+            </a:r>
+            <a:r>
+              <a:rPr lang="es-ES_tradnl" dirty="0" err="1"/>
+              <a:t>for</a:t>
+            </a:r>
+            <a:r>
+              <a:rPr lang="es-ES_tradnl" dirty="0"/>
+              <a:t> </a:t>
+            </a:r>
+            <a:r>
+              <a:rPr lang="es-ES_tradnl" dirty="0" err="1"/>
+              <a:t>users</a:t>
+            </a:r>
+            <a:r>
+              <a:rPr lang="es-ES_tradnl" dirty="0"/>
+              <a:t> </a:t>
+            </a:r>
+            <a:r>
+              <a:rPr lang="es-ES_tradnl" dirty="0" err="1"/>
+              <a:t>looking</a:t>
+            </a:r>
+            <a:r>
+              <a:rPr lang="es-ES_tradnl" dirty="0"/>
+              <a:t> </a:t>
+            </a:r>
+            <a:r>
+              <a:rPr lang="es-ES_tradnl" dirty="0" err="1"/>
+              <a:t>for</a:t>
+            </a:r>
+            <a:r>
+              <a:rPr lang="es-ES_tradnl" dirty="0"/>
+              <a:t> </a:t>
+            </a:r>
+            <a:r>
+              <a:rPr lang="es-ES_tradnl" dirty="0" err="1"/>
+              <a:t>platform-specific</a:t>
+            </a:r>
+            <a:r>
+              <a:rPr lang="es-ES_tradnl" dirty="0"/>
+              <a:t> </a:t>
+            </a:r>
+            <a:r>
+              <a:rPr lang="es-ES_tradnl" dirty="0" err="1"/>
+              <a:t>experience</a:t>
+            </a:r>
+            <a:r>
+              <a:rPr lang="es-ES_tradnl" dirty="0"/>
+              <a:t>. </a:t>
+            </a:r>
+          </a:p>
+          <a:p>
+            <a:pPr lvl="1"/>
+            <a:r>
+              <a:rPr lang="es-ES_tradnl" dirty="0" err="1" smtClean="0"/>
+              <a:t>SourceTree</a:t>
+            </a:r>
+            <a:r>
+              <a:rPr lang="es-ES_tradnl" dirty="0" smtClean="0"/>
+              <a:t> </a:t>
+            </a:r>
+            <a:r>
+              <a:rPr lang="es-ES_tradnl" dirty="0"/>
+              <a:t>(</a:t>
+            </a:r>
+            <a:r>
+              <a:rPr lang="es-ES_tradnl" dirty="0" err="1"/>
+              <a:t>SourceTree</a:t>
+            </a:r>
+            <a:r>
+              <a:rPr lang="es-ES_tradnl" dirty="0"/>
+              <a:t> </a:t>
+            </a:r>
+            <a:r>
+              <a:rPr lang="es-ES_tradnl" dirty="0" err="1"/>
+              <a:t>is</a:t>
+            </a:r>
+            <a:r>
+              <a:rPr lang="es-ES_tradnl" dirty="0"/>
+              <a:t> </a:t>
+            </a:r>
+            <a:r>
+              <a:rPr lang="es-ES_tradnl" dirty="0" err="1"/>
+              <a:t>Atlassian's</a:t>
+            </a:r>
+            <a:r>
+              <a:rPr lang="es-ES_tradnl" dirty="0"/>
+              <a:t> free desktop </a:t>
+            </a:r>
+            <a:r>
+              <a:rPr lang="es-ES_tradnl" dirty="0" err="1"/>
+              <a:t>client</a:t>
+            </a:r>
+            <a:r>
+              <a:rPr lang="es-ES_tradnl" dirty="0"/>
+              <a:t> </a:t>
+            </a:r>
+            <a:r>
+              <a:rPr lang="es-ES_tradnl" dirty="0" err="1"/>
+              <a:t>for</a:t>
+            </a:r>
+            <a:r>
+              <a:rPr lang="es-ES_tradnl" dirty="0"/>
+              <a:t> </a:t>
+            </a:r>
+            <a:r>
+              <a:rPr lang="es-ES_tradnl" dirty="0" err="1"/>
+              <a:t>Bitbucket</a:t>
+            </a:r>
+            <a:r>
+              <a:rPr lang="es-ES_tradnl" dirty="0"/>
+              <a:t>.)</a:t>
+            </a:r>
+          </a:p>
+          <a:p>
+            <a:pPr lvl="1"/>
+            <a:r>
+              <a:rPr lang="es-ES_tradnl" dirty="0" smtClean="0"/>
+              <a:t>GitHub </a:t>
+            </a:r>
+            <a:r>
+              <a:rPr lang="es-ES_tradnl" dirty="0"/>
+              <a:t>Desktop</a:t>
+            </a:r>
+          </a:p>
+          <a:p>
+            <a:pPr lvl="1"/>
+            <a:r>
+              <a:rPr lang="es-ES_tradnl" dirty="0" err="1" smtClean="0"/>
+              <a:t>TortoiseGit</a:t>
+            </a:r>
+            <a:r>
+              <a:rPr lang="mr-IN" dirty="0" smtClean="0"/>
+              <a:t> ...</a:t>
+            </a:r>
+            <a:endParaRPr lang="es-ES_tradnl" dirty="0" smtClean="0"/>
+          </a:p>
+        </p:txBody>
+      </p:sp>
+    </p:spTree>
+    <p:extLst>
+      <p:ext uri="{BB962C8B-B14F-4D97-AF65-F5344CB8AC3E}">
+        <p14:creationId xmlns:p14="http://schemas.microsoft.com/office/powerpoint/2010/main" val="1742130175"/>
+      </p:ext>
+    </p:extLst>
+  </p:cSld>
+  <p:clrMapOvr>
+    <a:masterClrMapping/>
+  </p:clrMapOvr>
+</p:sld>
+</file>
+
+<file path=ppt/slides/slide8.xml><?xml version="1.0" encoding="utf-8"?>
+<p:sld xmlns:a="http://schemas.openxmlformats.org/drawingml/2006/main" xmlns:r="http://schemas.openxmlformats.org/officeDocument/2006/relationships" xmlns:p="http://schemas.openxmlformats.org/presentationml/2006/main">
+  <p:cSld>
+    <p:spTree>
+      <p:nvGrpSpPr>
+        <p:cNvPr id="1" name=""/>
+        <p:cNvGrpSpPr/>
+        <p:nvPr/>
+      </p:nvGrpSpPr>
+      <p:grpSpPr>
+        <a:xfrm>
+          <a:off x="0" y="0"/>
+          <a:ext cx="0" cy="0"/>
+          <a:chOff x="0" y="0"/>
+          <a:chExt cx="0" cy="0"/>
+        </a:xfrm>
+      </p:grpSpPr>
+      <p:sp>
+        <p:nvSpPr>
+          <p:cNvPr id="2" name="Título 1"/>
+          <p:cNvSpPr>
+            <a:spLocks noGrp="1"/>
+          </p:cNvSpPr>
+          <p:nvPr>
+            <p:ph type="title"/>
+          </p:nvPr>
+        </p:nvSpPr>
+        <p:spPr/>
+        <p:txBody>
+          <a:bodyPr/>
+          <a:lstStyle/>
+          <a:p>
+            <a:r>
+              <a:rPr lang="es-ES_tradnl" dirty="0" smtClean="0"/>
+              <a:t>C</a:t>
+            </a:r>
+            <a:r>
+              <a:rPr lang="es-ES" dirty="0" err="1" smtClean="0"/>
+              <a:t>ómo</a:t>
+            </a:r>
+            <a:r>
+              <a:rPr lang="es-ES" dirty="0" smtClean="0"/>
+              <a:t> Funciona?</a:t>
+            </a:r>
+            <a:endParaRPr lang="es-ES_tradnl" dirty="0"/>
+          </a:p>
+        </p:txBody>
+      </p:sp>
+      <p:sp>
+        <p:nvSpPr>
+          <p:cNvPr id="3" name="Marcador de contenido 2"/>
+          <p:cNvSpPr>
+            <a:spLocks noGrp="1"/>
+          </p:cNvSpPr>
+          <p:nvPr>
+            <p:ph idx="1"/>
+          </p:nvPr>
+        </p:nvSpPr>
+        <p:spPr/>
+        <p:txBody>
+          <a:bodyPr/>
+          <a:lstStyle/>
+          <a:p>
+            <a:endParaRPr lang="es-ES_tradnl"/>
+          </a:p>
+        </p:txBody>
+      </p:sp>
+    </p:spTree>
+    <p:extLst>
+      <p:ext uri="{BB962C8B-B14F-4D97-AF65-F5344CB8AC3E}">
+        <p14:creationId xmlns:p14="http://schemas.microsoft.com/office/powerpoint/2010/main" val="1450622489"/>
+      </p:ext>
+    </p:extLst>
+  </p:cSld>
+  <p:clrMapOvr>
+    <a:masterClrMapping/>
+  </p:clrMapOvr>
+</p:sld>
+</file>
+
+<file path=ppt/slides/slide9.xml><?xml version="1.0" encoding="utf-8"?>
 <p:sld xmlns:a="http://schemas.openxmlformats.org/drawingml/2006/main" xmlns:r="http://schemas.openxmlformats.org/officeDocument/2006/relationships" xmlns:p="http://schemas.openxmlformats.org/presentationml/2006/main">
   <p:cSld>
     <p:spTree>
@@ -8008,971 +10312,6 @@
     <p:extLst>
       <p:ext uri="{BB962C8B-B14F-4D97-AF65-F5344CB8AC3E}">
         <p14:creationId xmlns:p14="http://schemas.microsoft.com/office/powerpoint/2010/main" val="1772697267"/>
-      </p:ext>
-    </p:extLst>
-  </p:cSld>
-  <p:clrMapOvr>
-    <a:masterClrMapping/>
-  </p:clrMapOvr>
-</p:sld>
-</file>
-
-<file path=ppt/slides/slide5.xml><?xml version="1.0" encoding="utf-8"?>
-<p:sld xmlns:a="http://schemas.openxmlformats.org/drawingml/2006/main" xmlns:r="http://schemas.openxmlformats.org/officeDocument/2006/relationships" xmlns:p="http://schemas.openxmlformats.org/presentationml/2006/main">
-  <p:cSld>
-    <p:spTree>
-      <p:nvGrpSpPr>
-        <p:cNvPr id="1" name=""/>
-        <p:cNvGrpSpPr/>
-        <p:nvPr/>
-      </p:nvGrpSpPr>
-      <p:grpSpPr>
-        <a:xfrm>
-          <a:off x="0" y="0"/>
-          <a:ext cx="0" cy="0"/>
-          <a:chOff x="0" y="0"/>
-          <a:chExt cx="0" cy="0"/>
-        </a:xfrm>
-      </p:grpSpPr>
-      <p:sp>
-        <p:nvSpPr>
-          <p:cNvPr id="2" name="Título 1"/>
-          <p:cNvSpPr>
-            <a:spLocks noGrp="1"/>
-          </p:cNvSpPr>
-          <p:nvPr>
-            <p:ph type="title"/>
-          </p:nvPr>
-        </p:nvSpPr>
-        <p:spPr>
-          <a:xfrm>
-            <a:off x="1484310" y="117389"/>
-            <a:ext cx="10018713" cy="673443"/>
-          </a:xfrm>
-        </p:spPr>
-        <p:txBody>
-          <a:bodyPr>
-            <a:normAutofit fontScale="90000"/>
-          </a:bodyPr>
-          <a:lstStyle/>
-          <a:p>
-            <a:r>
-              <a:rPr lang="es-ES" dirty="0" smtClean="0"/>
-              <a:t>Estados de </a:t>
-            </a:r>
-            <a:r>
-              <a:rPr lang="es-ES_tradnl" dirty="0" smtClean="0"/>
-              <a:t>GIT</a:t>
-            </a:r>
-            <a:endParaRPr lang="es-ES_tradnl" dirty="0"/>
-          </a:p>
-        </p:txBody>
-      </p:sp>
-      <p:pic>
-        <p:nvPicPr>
-          <p:cNvPr id="5" name="Imagen 4"/>
-          <p:cNvPicPr>
-            <a:picLocks noChangeAspect="1"/>
-          </p:cNvPicPr>
-          <p:nvPr/>
-        </p:nvPicPr>
-        <p:blipFill>
-          <a:blip r:embed="rId2">
-            <a:extLst>
-              <a:ext uri="{28A0092B-C50C-407E-A947-70E740481C1C}">
-                <a14:useLocalDpi xmlns:a14="http://schemas.microsoft.com/office/drawing/2010/main" val="0"/>
-              </a:ext>
-            </a:extLst>
-          </a:blip>
-          <a:stretch>
-            <a:fillRect/>
-          </a:stretch>
-        </p:blipFill>
-        <p:spPr>
-          <a:xfrm>
-            <a:off x="1484310" y="1283730"/>
-            <a:ext cx="4270512" cy="4017319"/>
-          </a:xfrm>
-          <a:prstGeom prst="rect">
-            <a:avLst/>
-          </a:prstGeom>
-        </p:spPr>
-      </p:pic>
-      <p:sp>
-        <p:nvSpPr>
-          <p:cNvPr id="6" name="CuadroTexto 5"/>
-          <p:cNvSpPr txBox="1"/>
-          <p:nvPr/>
-        </p:nvSpPr>
-        <p:spPr>
-          <a:xfrm>
-            <a:off x="6263758" y="1283730"/>
-            <a:ext cx="5239265" cy="2862322"/>
-          </a:xfrm>
-          <a:prstGeom prst="rect">
-            <a:avLst/>
-          </a:prstGeom>
-          <a:noFill/>
-        </p:spPr>
-        <p:txBody>
-          <a:bodyPr wrap="square" rtlCol="0">
-            <a:spAutoFit/>
-          </a:bodyPr>
-          <a:lstStyle/>
-          <a:p>
-            <a:pPr marL="285750" indent="-285750" algn="just">
-              <a:buFont typeface="Arial" charset="0"/>
-              <a:buChar char="•"/>
-            </a:pPr>
-            <a:r>
-              <a:rPr lang="es-ES_tradnl" b="1" dirty="0"/>
-              <a:t>C</a:t>
-            </a:r>
-            <a:r>
-              <a:rPr lang="es-ES_tradnl" b="1" dirty="0" smtClean="0"/>
-              <a:t>onfirmado (</a:t>
-            </a:r>
-            <a:r>
-              <a:rPr lang="es-ES_tradnl" b="1" dirty="0" err="1" smtClean="0"/>
-              <a:t>committed</a:t>
-            </a:r>
-            <a:r>
-              <a:rPr lang="es-ES_tradnl" b="1" dirty="0" smtClean="0"/>
-              <a:t>): </a:t>
-            </a:r>
-            <a:r>
-              <a:rPr lang="es-ES_tradnl" dirty="0" smtClean="0"/>
-              <a:t>Los datos </a:t>
-            </a:r>
-            <a:r>
-              <a:rPr lang="es-ES_tradnl" dirty="0" err="1" smtClean="0"/>
-              <a:t>estan</a:t>
-            </a:r>
-            <a:r>
-              <a:rPr lang="es-ES_tradnl" dirty="0" smtClean="0"/>
-              <a:t> almacenados de manera segura en tu base de datos local.</a:t>
-            </a:r>
-            <a:endParaRPr lang="es-ES_tradnl" b="1" dirty="0" smtClean="0"/>
-          </a:p>
-          <a:p>
-            <a:pPr marL="285750" indent="-285750" algn="just">
-              <a:buFont typeface="Arial" charset="0"/>
-              <a:buChar char="•"/>
-            </a:pPr>
-            <a:r>
-              <a:rPr lang="es-ES_tradnl" b="1" dirty="0"/>
-              <a:t>M</a:t>
-            </a:r>
-            <a:r>
-              <a:rPr lang="es-ES_tradnl" b="1" dirty="0" smtClean="0"/>
-              <a:t>odificado (</a:t>
-            </a:r>
-            <a:r>
-              <a:rPr lang="es-ES_tradnl" b="1" dirty="0" err="1" smtClean="0"/>
-              <a:t>modified</a:t>
-            </a:r>
-            <a:r>
-              <a:rPr lang="es-ES_tradnl" b="1" dirty="0" smtClean="0"/>
-              <a:t>): </a:t>
-            </a:r>
-            <a:r>
-              <a:rPr lang="es-ES_tradnl" dirty="0" smtClean="0"/>
-              <a:t>Significa que has modificado </a:t>
-            </a:r>
-            <a:r>
-              <a:rPr lang="es-ES_tradnl" dirty="0" err="1" smtClean="0"/>
-              <a:t>algun</a:t>
-            </a:r>
-            <a:r>
-              <a:rPr lang="es-ES_tradnl" dirty="0" smtClean="0"/>
-              <a:t> archivo pero que aun no lo confirmas.</a:t>
-            </a:r>
-            <a:endParaRPr lang="es-ES_tradnl" b="1" dirty="0" smtClean="0"/>
-          </a:p>
-          <a:p>
-            <a:pPr marL="285750" indent="-285750" algn="just">
-              <a:buFont typeface="Arial" charset="0"/>
-              <a:buChar char="•"/>
-            </a:pPr>
-            <a:r>
-              <a:rPr lang="es-ES_tradnl" b="1" dirty="0"/>
-              <a:t>P</a:t>
-            </a:r>
-            <a:r>
-              <a:rPr lang="es-ES_tradnl" b="1" dirty="0" smtClean="0"/>
-              <a:t>reparado (</a:t>
-            </a:r>
-            <a:r>
-              <a:rPr lang="es-ES_tradnl" b="1" dirty="0" err="1" smtClean="0"/>
-              <a:t>stage</a:t>
-            </a:r>
-            <a:r>
-              <a:rPr lang="es-ES_tradnl" b="1" dirty="0" smtClean="0"/>
-              <a:t>): </a:t>
-            </a:r>
-            <a:r>
-              <a:rPr lang="es-ES_tradnl" dirty="0" smtClean="0"/>
-              <a:t>Significa que has marcado algún archivo modificado en su versión actual  para confirmarlo.</a:t>
-            </a:r>
-          </a:p>
-          <a:p>
-            <a:pPr marL="285750" indent="-285750" algn="just">
-              <a:buFont typeface="Arial" charset="0"/>
-              <a:buChar char="•"/>
-            </a:pPr>
-            <a:endParaRPr lang="es-ES_tradnl" b="1" dirty="0"/>
-          </a:p>
-        </p:txBody>
-      </p:sp>
-      <p:sp>
-        <p:nvSpPr>
-          <p:cNvPr id="7" name="CuadroTexto 6"/>
-          <p:cNvSpPr txBox="1"/>
-          <p:nvPr/>
-        </p:nvSpPr>
-        <p:spPr>
-          <a:xfrm>
-            <a:off x="6263758" y="4146052"/>
-            <a:ext cx="5536945" cy="1785104"/>
-          </a:xfrm>
-          <a:prstGeom prst="rect">
-            <a:avLst/>
-          </a:prstGeom>
-          <a:noFill/>
-        </p:spPr>
-        <p:txBody>
-          <a:bodyPr wrap="square" rtlCol="0">
-            <a:spAutoFit/>
-          </a:bodyPr>
-          <a:lstStyle/>
-          <a:p>
-            <a:r>
-              <a:rPr lang="es-ES_tradnl" b="1" dirty="0" smtClean="0"/>
-              <a:t>FLUJO DE TRABAJO</a:t>
-            </a:r>
-          </a:p>
-          <a:p>
-            <a:pPr marL="342900" indent="-342900">
-              <a:buFont typeface="+mj-lt"/>
-              <a:buAutoNum type="arabicPeriod"/>
-            </a:pPr>
-            <a:r>
-              <a:rPr lang="es-ES_tradnl" dirty="0" smtClean="0"/>
-              <a:t>Modificar archivos en directorio trabajo.</a:t>
-            </a:r>
-          </a:p>
-          <a:p>
-            <a:pPr marL="342900" indent="-342900">
-              <a:buFont typeface="+mj-lt"/>
-              <a:buAutoNum type="arabicPeriod"/>
-            </a:pPr>
-            <a:r>
-              <a:rPr lang="es-ES_tradnl" dirty="0" smtClean="0"/>
-              <a:t>Preparar los archivo, </a:t>
-            </a:r>
-            <a:r>
-              <a:rPr lang="es-ES_tradnl" dirty="0" err="1" smtClean="0"/>
-              <a:t>instantaneas</a:t>
-            </a:r>
-            <a:r>
-              <a:rPr lang="es-ES_tradnl" dirty="0" smtClean="0"/>
-              <a:t> en el área de preparación.</a:t>
-            </a:r>
-          </a:p>
-          <a:p>
-            <a:pPr marL="342900" indent="-342900">
-              <a:buFont typeface="+mj-lt"/>
-              <a:buAutoNum type="arabicPeriod"/>
-            </a:pPr>
-            <a:r>
-              <a:rPr lang="es-ES_tradnl" dirty="0" smtClean="0"/>
-              <a:t>Confirmar los cambios, almacenando sus instantáneas en el directorio GIT.</a:t>
-            </a:r>
-            <a:endParaRPr lang="es-ES_tradnl" dirty="0"/>
-          </a:p>
-        </p:txBody>
-      </p:sp>
-      <p:sp>
-        <p:nvSpPr>
-          <p:cNvPr id="9" name="CuadroTexto 8"/>
-          <p:cNvSpPr txBox="1"/>
-          <p:nvPr/>
-        </p:nvSpPr>
-        <p:spPr>
-          <a:xfrm>
-            <a:off x="56876" y="6340526"/>
-            <a:ext cx="2902205" cy="369332"/>
-          </a:xfrm>
-          <a:prstGeom prst="rect">
-            <a:avLst/>
-          </a:prstGeom>
-          <a:solidFill>
-            <a:schemeClr val="tx2">
-              <a:lumMod val="75000"/>
-              <a:lumOff val="25000"/>
-            </a:schemeClr>
-          </a:solidFill>
-        </p:spPr>
-        <p:txBody>
-          <a:bodyPr wrap="none" rtlCol="0">
-            <a:spAutoFit/>
-          </a:bodyPr>
-          <a:lstStyle/>
-          <a:p>
-            <a:r>
-              <a:rPr lang="es-ES_tradnl" dirty="0" smtClean="0">
-                <a:solidFill>
-                  <a:schemeClr val="bg1"/>
-                </a:solidFill>
-              </a:rPr>
-              <a:t>Fuente: https</a:t>
-            </a:r>
-            <a:r>
-              <a:rPr lang="es-ES_tradnl" dirty="0">
-                <a:solidFill>
-                  <a:schemeClr val="bg1"/>
-                </a:solidFill>
-              </a:rPr>
-              <a:t>://</a:t>
-            </a:r>
-            <a:r>
-              <a:rPr lang="es-ES_tradnl" dirty="0" err="1">
-                <a:solidFill>
-                  <a:schemeClr val="bg1"/>
-                </a:solidFill>
-              </a:rPr>
-              <a:t>git-scm.com</a:t>
-            </a:r>
-            <a:r>
-              <a:rPr lang="es-ES_tradnl" dirty="0">
-                <a:solidFill>
-                  <a:schemeClr val="bg1"/>
-                </a:solidFill>
-              </a:rPr>
-              <a:t>/</a:t>
-            </a:r>
-          </a:p>
-        </p:txBody>
-      </p:sp>
-    </p:spTree>
-    <p:extLst>
-      <p:ext uri="{BB962C8B-B14F-4D97-AF65-F5344CB8AC3E}">
-        <p14:creationId xmlns:p14="http://schemas.microsoft.com/office/powerpoint/2010/main" val="1646112634"/>
-      </p:ext>
-    </p:extLst>
-  </p:cSld>
-  <p:clrMapOvr>
-    <a:masterClrMapping/>
-  </p:clrMapOvr>
-</p:sld>
-</file>
-
-<file path=ppt/slides/slide6.xml><?xml version="1.0" encoding="utf-8"?>
-<p:sld xmlns:a="http://schemas.openxmlformats.org/drawingml/2006/main" xmlns:r="http://schemas.openxmlformats.org/officeDocument/2006/relationships" xmlns:p="http://schemas.openxmlformats.org/presentationml/2006/main">
-  <p:cSld>
-    <p:spTree>
-      <p:nvGrpSpPr>
-        <p:cNvPr id="1" name=""/>
-        <p:cNvGrpSpPr/>
-        <p:nvPr/>
-      </p:nvGrpSpPr>
-      <p:grpSpPr>
-        <a:xfrm>
-          <a:off x="0" y="0"/>
-          <a:ext cx="0" cy="0"/>
-          <a:chOff x="0" y="0"/>
-          <a:chExt cx="0" cy="0"/>
-        </a:xfrm>
-      </p:grpSpPr>
-      <p:sp>
-        <p:nvSpPr>
-          <p:cNvPr id="2" name="Título 1"/>
-          <p:cNvSpPr>
-            <a:spLocks noGrp="1"/>
-          </p:cNvSpPr>
-          <p:nvPr>
-            <p:ph type="title"/>
-          </p:nvPr>
-        </p:nvSpPr>
-        <p:spPr>
-          <a:xfrm>
-            <a:off x="1484310" y="117389"/>
-            <a:ext cx="10018713" cy="673443"/>
-          </a:xfrm>
-        </p:spPr>
-        <p:txBody>
-          <a:bodyPr>
-            <a:normAutofit fontScale="90000"/>
-          </a:bodyPr>
-          <a:lstStyle/>
-          <a:p>
-            <a:r>
-              <a:rPr lang="es-ES" dirty="0" smtClean="0"/>
-              <a:t>Ramas en </a:t>
-            </a:r>
-            <a:r>
-              <a:rPr lang="es-ES_tradnl" dirty="0" smtClean="0"/>
-              <a:t>GIT (</a:t>
-            </a:r>
-            <a:r>
-              <a:rPr lang="es-ES_tradnl" dirty="0" err="1" smtClean="0"/>
-              <a:t>branching</a:t>
-            </a:r>
-            <a:r>
-              <a:rPr lang="es-ES_tradnl" dirty="0" smtClean="0"/>
-              <a:t>)</a:t>
-            </a:r>
-            <a:endParaRPr lang="es-ES_tradnl" dirty="0"/>
-          </a:p>
-        </p:txBody>
-      </p:sp>
-      <p:sp>
-        <p:nvSpPr>
-          <p:cNvPr id="6" name="CuadroTexto 5"/>
-          <p:cNvSpPr txBox="1"/>
-          <p:nvPr/>
-        </p:nvSpPr>
-        <p:spPr>
-          <a:xfrm>
-            <a:off x="6263758" y="1283730"/>
-            <a:ext cx="5239265" cy="4247317"/>
-          </a:xfrm>
-          <a:prstGeom prst="rect">
-            <a:avLst/>
-          </a:prstGeom>
-          <a:noFill/>
-        </p:spPr>
-        <p:txBody>
-          <a:bodyPr wrap="square" rtlCol="0">
-            <a:spAutoFit/>
-          </a:bodyPr>
-          <a:lstStyle/>
-          <a:p>
-            <a:pPr marL="285750" indent="-285750" algn="just">
-              <a:buFont typeface="Arial" charset="0"/>
-              <a:buChar char="•"/>
-            </a:pPr>
-            <a:r>
-              <a:rPr lang="es-ES_tradnl" dirty="0" smtClean="0"/>
-              <a:t>Existe una rama principal (master), la cual es la inicial.</a:t>
-            </a:r>
-          </a:p>
-          <a:p>
-            <a:pPr marL="285750" indent="-285750" algn="just">
-              <a:buFont typeface="Arial" charset="0"/>
-              <a:buChar char="•"/>
-            </a:pPr>
-            <a:r>
-              <a:rPr lang="es-ES_tradnl" dirty="0" smtClean="0"/>
-              <a:t>Se pueden crear ramas en base a master o </a:t>
-            </a:r>
-            <a:r>
-              <a:rPr lang="es-ES_tradnl" dirty="0" err="1" smtClean="0"/>
-              <a:t>subramas</a:t>
-            </a:r>
-            <a:r>
-              <a:rPr lang="es-ES_tradnl" dirty="0" smtClean="0"/>
-              <a:t> (copia de archivos desde rama).</a:t>
-            </a:r>
-          </a:p>
-          <a:p>
-            <a:pPr marL="285750" indent="-285750" algn="just">
-              <a:buFont typeface="Arial" charset="0"/>
-              <a:buChar char="•"/>
-            </a:pPr>
-            <a:r>
-              <a:rPr lang="es-ES_tradnl" dirty="0"/>
-              <a:t>Cada </a:t>
-            </a:r>
-            <a:r>
-              <a:rPr lang="es-ES_tradnl" dirty="0" err="1"/>
-              <a:t>commit</a:t>
-            </a:r>
-            <a:r>
-              <a:rPr lang="es-ES_tradnl" dirty="0"/>
-              <a:t> almacena las instantáneas de los archivos en base a su </a:t>
-            </a:r>
-            <a:r>
-              <a:rPr lang="es-ES_tradnl" dirty="0" err="1" smtClean="0"/>
-              <a:t>checksum</a:t>
-            </a:r>
-            <a:r>
-              <a:rPr lang="es-ES_tradnl" dirty="0" smtClean="0"/>
-              <a:t> (nodo verde).</a:t>
-            </a:r>
-          </a:p>
-          <a:p>
-            <a:pPr marL="285750" indent="-285750" algn="just">
-              <a:buFont typeface="Arial" charset="0"/>
-              <a:buChar char="•"/>
-            </a:pPr>
-            <a:r>
-              <a:rPr lang="es-ES_tradnl" dirty="0" smtClean="0"/>
-              <a:t>Se avanza en paralelo en las diferentes ramas realizando cambios.</a:t>
-            </a:r>
-          </a:p>
-          <a:p>
-            <a:pPr marL="285750" indent="-285750" algn="just">
-              <a:buFont typeface="Arial" charset="0"/>
-              <a:buChar char="•"/>
-            </a:pPr>
-            <a:r>
-              <a:rPr lang="es-ES_tradnl" dirty="0" smtClean="0"/>
-              <a:t>HEAD es el apuntador que nos indica en la </a:t>
-            </a:r>
-            <a:r>
-              <a:rPr lang="es-ES_tradnl" dirty="0" err="1" smtClean="0"/>
-              <a:t>version</a:t>
-            </a:r>
-            <a:r>
-              <a:rPr lang="es-ES_tradnl" dirty="0" smtClean="0"/>
-              <a:t> y rama que nos encontramos, la cual se puede mover entre ramas (</a:t>
-            </a:r>
-            <a:r>
-              <a:rPr lang="es-ES_tradnl" dirty="0" err="1" smtClean="0"/>
-              <a:t>checkout</a:t>
-            </a:r>
-            <a:r>
-              <a:rPr lang="es-ES_tradnl" dirty="0" smtClean="0"/>
-              <a:t>).</a:t>
-            </a:r>
-          </a:p>
-          <a:p>
-            <a:pPr marL="285750" indent="-285750" algn="just">
-              <a:buFont typeface="Arial" charset="0"/>
-              <a:buChar char="•"/>
-            </a:pPr>
-            <a:r>
-              <a:rPr lang="es-ES_tradnl" dirty="0" smtClean="0"/>
-              <a:t>Al fusionar las ramas, se arrastran los cambios a la rama principal (fusión de cambios).</a:t>
-            </a:r>
-          </a:p>
-          <a:p>
-            <a:pPr marL="285750" indent="-285750" algn="just">
-              <a:buFont typeface="Arial" charset="0"/>
-              <a:buChar char="•"/>
-            </a:pPr>
-            <a:endParaRPr lang="es-ES_tradnl" dirty="0" smtClean="0"/>
-          </a:p>
-          <a:p>
-            <a:pPr marL="285750" indent="-285750" algn="just">
-              <a:buFont typeface="Arial" charset="0"/>
-              <a:buChar char="•"/>
-            </a:pPr>
-            <a:endParaRPr lang="es-ES_tradnl" b="1" dirty="0"/>
-          </a:p>
-        </p:txBody>
-      </p:sp>
-      <p:pic>
-        <p:nvPicPr>
-          <p:cNvPr id="8" name="Imagen 7"/>
-          <p:cNvPicPr>
-            <a:picLocks noChangeAspect="1"/>
-          </p:cNvPicPr>
-          <p:nvPr/>
-        </p:nvPicPr>
-        <p:blipFill>
-          <a:blip r:embed="rId2">
-            <a:extLst>
-              <a:ext uri="{28A0092B-C50C-407E-A947-70E740481C1C}">
-                <a14:useLocalDpi xmlns:a14="http://schemas.microsoft.com/office/drawing/2010/main" val="0"/>
-              </a:ext>
-            </a:extLst>
-          </a:blip>
-          <a:stretch>
-            <a:fillRect/>
-          </a:stretch>
-        </p:blipFill>
-        <p:spPr>
-          <a:xfrm>
-            <a:off x="1176638" y="1038998"/>
-            <a:ext cx="4965259" cy="5213522"/>
-          </a:xfrm>
-          <a:prstGeom prst="rect">
-            <a:avLst/>
-          </a:prstGeom>
-        </p:spPr>
-      </p:pic>
-      <p:sp>
-        <p:nvSpPr>
-          <p:cNvPr id="7" name="CuadroTexto 6"/>
-          <p:cNvSpPr txBox="1"/>
-          <p:nvPr/>
-        </p:nvSpPr>
-        <p:spPr>
-          <a:xfrm>
-            <a:off x="56876" y="6340526"/>
-            <a:ext cx="2902205" cy="369332"/>
-          </a:xfrm>
-          <a:prstGeom prst="rect">
-            <a:avLst/>
-          </a:prstGeom>
-          <a:solidFill>
-            <a:schemeClr val="tx2">
-              <a:lumMod val="75000"/>
-              <a:lumOff val="25000"/>
-            </a:schemeClr>
-          </a:solidFill>
-        </p:spPr>
-        <p:txBody>
-          <a:bodyPr wrap="none" rtlCol="0">
-            <a:spAutoFit/>
-          </a:bodyPr>
-          <a:lstStyle/>
-          <a:p>
-            <a:r>
-              <a:rPr lang="es-ES_tradnl" dirty="0" smtClean="0">
-                <a:solidFill>
-                  <a:schemeClr val="bg1"/>
-                </a:solidFill>
-              </a:rPr>
-              <a:t>Fuente: https</a:t>
-            </a:r>
-            <a:r>
-              <a:rPr lang="es-ES_tradnl" dirty="0">
-                <a:solidFill>
-                  <a:schemeClr val="bg1"/>
-                </a:solidFill>
-              </a:rPr>
-              <a:t>://</a:t>
-            </a:r>
-            <a:r>
-              <a:rPr lang="es-ES_tradnl" dirty="0" err="1">
-                <a:solidFill>
-                  <a:schemeClr val="bg1"/>
-                </a:solidFill>
-              </a:rPr>
-              <a:t>git-scm.com</a:t>
-            </a:r>
-            <a:r>
-              <a:rPr lang="es-ES_tradnl" dirty="0">
-                <a:solidFill>
-                  <a:schemeClr val="bg1"/>
-                </a:solidFill>
-              </a:rPr>
-              <a:t>/</a:t>
-            </a:r>
-          </a:p>
-        </p:txBody>
-      </p:sp>
-    </p:spTree>
-    <p:extLst>
-      <p:ext uri="{BB962C8B-B14F-4D97-AF65-F5344CB8AC3E}">
-        <p14:creationId xmlns:p14="http://schemas.microsoft.com/office/powerpoint/2010/main" val="1378200591"/>
-      </p:ext>
-    </p:extLst>
-  </p:cSld>
-  <p:clrMapOvr>
-    <a:masterClrMapping/>
-  </p:clrMapOvr>
-</p:sld>
-</file>
-
-<file path=ppt/slides/slide7.xml><?xml version="1.0" encoding="utf-8"?>
-<p:sld xmlns:a="http://schemas.openxmlformats.org/drawingml/2006/main" xmlns:r="http://schemas.openxmlformats.org/officeDocument/2006/relationships" xmlns:p="http://schemas.openxmlformats.org/presentationml/2006/main">
-  <p:cSld>
-    <p:spTree>
-      <p:nvGrpSpPr>
-        <p:cNvPr id="1" name=""/>
-        <p:cNvGrpSpPr/>
-        <p:nvPr/>
-      </p:nvGrpSpPr>
-      <p:grpSpPr>
-        <a:xfrm>
-          <a:off x="0" y="0"/>
-          <a:ext cx="0" cy="0"/>
-          <a:chOff x="0" y="0"/>
-          <a:chExt cx="0" cy="0"/>
-        </a:xfrm>
-      </p:grpSpPr>
-      <p:sp>
-        <p:nvSpPr>
-          <p:cNvPr id="2" name="Título 1"/>
-          <p:cNvSpPr>
-            <a:spLocks noGrp="1"/>
-          </p:cNvSpPr>
-          <p:nvPr>
-            <p:ph type="title"/>
-          </p:nvPr>
-        </p:nvSpPr>
-        <p:spPr>
-          <a:xfrm>
-            <a:off x="1484310" y="117389"/>
-            <a:ext cx="10018713" cy="673443"/>
-          </a:xfrm>
-        </p:spPr>
-        <p:txBody>
-          <a:bodyPr>
-            <a:normAutofit fontScale="90000"/>
-          </a:bodyPr>
-          <a:lstStyle/>
-          <a:p>
-            <a:r>
-              <a:rPr lang="es-ES" dirty="0" smtClean="0"/>
-              <a:t>Actividades con GIT</a:t>
-            </a:r>
-            <a:endParaRPr lang="es-ES_tradnl" dirty="0"/>
-          </a:p>
-        </p:txBody>
-      </p:sp>
-      <p:sp>
-        <p:nvSpPr>
-          <p:cNvPr id="6" name="CuadroTexto 5"/>
-          <p:cNvSpPr txBox="1"/>
-          <p:nvPr/>
-        </p:nvSpPr>
-        <p:spPr>
-          <a:xfrm>
-            <a:off x="1804086" y="1283730"/>
-            <a:ext cx="9698937" cy="3416320"/>
-          </a:xfrm>
-          <a:prstGeom prst="rect">
-            <a:avLst/>
-          </a:prstGeom>
-          <a:noFill/>
-        </p:spPr>
-        <p:txBody>
-          <a:bodyPr wrap="square" rtlCol="0">
-            <a:spAutoFit/>
-          </a:bodyPr>
-          <a:lstStyle/>
-          <a:p>
-            <a:pPr marL="342900" marR="0" lvl="0" indent="-342900" algn="just" defTabSz="914400" eaLnBrk="1" fontAlgn="auto" latinLnBrk="0" hangingPunct="1">
-              <a:lnSpc>
-                <a:spcPct val="100000"/>
-              </a:lnSpc>
-              <a:spcBef>
-                <a:spcPts val="0"/>
-              </a:spcBef>
-              <a:spcAft>
-                <a:spcPts val="0"/>
-              </a:spcAft>
-              <a:buClrTx/>
-              <a:buSzTx/>
-              <a:buFont typeface="+mj-lt"/>
-              <a:buAutoNum type="arabicPeriod"/>
-              <a:tabLst/>
-              <a:defRPr/>
-            </a:pPr>
-            <a:r>
-              <a:rPr lang="es-ES_tradnl" dirty="0" smtClean="0"/>
-              <a:t>Crear cuenta</a:t>
-            </a:r>
-          </a:p>
-          <a:p>
-            <a:pPr marL="800100" lvl="1" indent="-342900" algn="just" defTabSz="914400">
-              <a:buFont typeface="+mj-lt"/>
-              <a:buAutoNum type="alphaLcParenR"/>
-            </a:pPr>
-            <a:r>
-              <a:rPr lang="es-ES_tradnl" dirty="0" smtClean="0"/>
-              <a:t>Registro en </a:t>
-            </a:r>
-            <a:r>
-              <a:rPr lang="es-ES_tradnl" dirty="0" err="1" smtClean="0"/>
-              <a:t>github</a:t>
-            </a:r>
-            <a:r>
-              <a:rPr lang="es-ES_tradnl" dirty="0" smtClean="0"/>
-              <a:t>.</a:t>
-            </a:r>
-          </a:p>
-          <a:p>
-            <a:pPr marL="800100" lvl="1" indent="-342900" algn="just" defTabSz="914400">
-              <a:buFont typeface="+mj-lt"/>
-              <a:buAutoNum type="alphaLcParenR"/>
-            </a:pPr>
-            <a:r>
-              <a:rPr lang="es-ES_tradnl" dirty="0" smtClean="0"/>
-              <a:t>Crear un proyecto (repositorio) de prueba.</a:t>
-            </a:r>
-          </a:p>
-          <a:p>
-            <a:pPr marL="800100" lvl="1" indent="-342900" algn="just" defTabSz="914400">
-              <a:buFont typeface="+mj-lt"/>
-              <a:buAutoNum type="alphaLcParenR"/>
-            </a:pPr>
-            <a:r>
-              <a:rPr lang="es-ES_tradnl" dirty="0" smtClean="0"/>
-              <a:t>Crear un archivo y realizar cambios.</a:t>
-            </a:r>
-          </a:p>
-          <a:p>
-            <a:pPr marL="800100" lvl="1" indent="-342900" algn="just" defTabSz="914400">
-              <a:buFont typeface="+mj-lt"/>
-              <a:buAutoNum type="alphaLcParenR"/>
-            </a:pPr>
-            <a:r>
-              <a:rPr lang="es-ES_tradnl" dirty="0" smtClean="0"/>
-              <a:t>Confirmar los cambios y subir cambios.</a:t>
-            </a:r>
-          </a:p>
-          <a:p>
-            <a:pPr marL="800100" lvl="1" indent="-342900" algn="just" defTabSz="914400">
-              <a:buFont typeface="+mj-lt"/>
-              <a:buAutoNum type="alphaLcParenR"/>
-            </a:pPr>
-            <a:endParaRPr lang="es-ES_tradnl" dirty="0" smtClean="0"/>
-          </a:p>
-          <a:p>
-            <a:pPr marL="342900" indent="-342900" algn="just" defTabSz="914400">
-              <a:buFont typeface="+mj-lt"/>
-              <a:buAutoNum type="arabicPeriod"/>
-            </a:pPr>
-            <a:r>
-              <a:rPr lang="es-ES_tradnl" dirty="0" smtClean="0"/>
-              <a:t>Clonar un proyecto existente</a:t>
-            </a:r>
-          </a:p>
-          <a:p>
-            <a:pPr marL="800100" lvl="1" indent="-342900" algn="just" defTabSz="914400">
-              <a:buFont typeface="+mj-lt"/>
-              <a:buAutoNum type="alphaLcParenR"/>
-            </a:pPr>
-            <a:r>
-              <a:rPr lang="es-ES_tradnl" dirty="0" smtClean="0"/>
-              <a:t>Ubicarse en la rama correspondiente.</a:t>
-            </a:r>
-          </a:p>
-          <a:p>
-            <a:pPr marL="800100" lvl="1" indent="-342900" algn="just" defTabSz="914400">
-              <a:buFont typeface="+mj-lt"/>
-              <a:buAutoNum type="alphaLcParenR"/>
-            </a:pPr>
-            <a:r>
-              <a:rPr lang="es-ES_tradnl" dirty="0" smtClean="0"/>
-              <a:t>Realizar cambios a un determinado archivo.</a:t>
-            </a:r>
-          </a:p>
-          <a:p>
-            <a:pPr marL="800100" lvl="1" indent="-342900" algn="just" defTabSz="914400">
-              <a:buFont typeface="+mj-lt"/>
-              <a:buAutoNum type="alphaLcParenR"/>
-            </a:pPr>
-            <a:r>
-              <a:rPr lang="es-ES_tradnl" dirty="0" smtClean="0"/>
-              <a:t>Confirmar cambios y subirlos.</a:t>
-            </a:r>
-          </a:p>
-          <a:p>
-            <a:pPr marL="800100" lvl="1" indent="-342900" algn="just" defTabSz="914400">
-              <a:buFont typeface="+mj-lt"/>
-              <a:buAutoNum type="alphaLcParenR"/>
-            </a:pPr>
-            <a:r>
-              <a:rPr lang="es-ES_tradnl" dirty="0" smtClean="0"/>
-              <a:t>Fusionar las ramas (administrador).</a:t>
-            </a:r>
-          </a:p>
-          <a:p>
-            <a:pPr marL="800100" lvl="1" indent="-342900" algn="just" defTabSz="914400">
-              <a:buFont typeface="+mj-lt"/>
-              <a:buAutoNum type="alphaLcParenR"/>
-            </a:pPr>
-            <a:r>
-              <a:rPr lang="es-ES_tradnl" dirty="0" smtClean="0"/>
-              <a:t>Visualizar versión actualizada en master.</a:t>
-            </a:r>
-            <a:endParaRPr lang="es-ES_tradnl" dirty="0"/>
-          </a:p>
-        </p:txBody>
-      </p:sp>
-      <p:sp>
-        <p:nvSpPr>
-          <p:cNvPr id="4" name="CuadroTexto 3"/>
-          <p:cNvSpPr txBox="1"/>
-          <p:nvPr/>
-        </p:nvSpPr>
-        <p:spPr>
-          <a:xfrm>
-            <a:off x="56876" y="6340526"/>
-            <a:ext cx="2902205" cy="369332"/>
-          </a:xfrm>
-          <a:prstGeom prst="rect">
-            <a:avLst/>
-          </a:prstGeom>
-          <a:solidFill>
-            <a:schemeClr val="tx2">
-              <a:lumMod val="75000"/>
-              <a:lumOff val="25000"/>
-            </a:schemeClr>
-          </a:solidFill>
-        </p:spPr>
-        <p:txBody>
-          <a:bodyPr wrap="none" rtlCol="0">
-            <a:spAutoFit/>
-          </a:bodyPr>
-          <a:lstStyle/>
-          <a:p>
-            <a:r>
-              <a:rPr lang="es-ES_tradnl" dirty="0" smtClean="0">
-                <a:solidFill>
-                  <a:schemeClr val="bg1"/>
-                </a:solidFill>
-              </a:rPr>
-              <a:t>Fuente: https</a:t>
-            </a:r>
-            <a:r>
-              <a:rPr lang="es-ES_tradnl" dirty="0">
-                <a:solidFill>
-                  <a:schemeClr val="bg1"/>
-                </a:solidFill>
-              </a:rPr>
-              <a:t>://</a:t>
-            </a:r>
-            <a:r>
-              <a:rPr lang="es-ES_tradnl" dirty="0" err="1">
-                <a:solidFill>
-                  <a:schemeClr val="bg1"/>
-                </a:solidFill>
-              </a:rPr>
-              <a:t>git-scm.com</a:t>
-            </a:r>
-            <a:r>
-              <a:rPr lang="es-ES_tradnl" dirty="0">
-                <a:solidFill>
-                  <a:schemeClr val="bg1"/>
-                </a:solidFill>
-              </a:rPr>
-              <a:t>/</a:t>
-            </a:r>
-          </a:p>
-        </p:txBody>
-      </p:sp>
-      <p:pic>
-        <p:nvPicPr>
-          <p:cNvPr id="3" name="Imagen 2"/>
-          <p:cNvPicPr>
-            <a:picLocks noChangeAspect="1"/>
-          </p:cNvPicPr>
-          <p:nvPr/>
-        </p:nvPicPr>
-        <p:blipFill>
-          <a:blip r:embed="rId2">
-            <a:extLst>
-              <a:ext uri="{28A0092B-C50C-407E-A947-70E740481C1C}">
-                <a14:useLocalDpi xmlns:a14="http://schemas.microsoft.com/office/drawing/2010/main" val="0"/>
-              </a:ext>
-            </a:extLst>
-          </a:blip>
-          <a:stretch>
-            <a:fillRect/>
-          </a:stretch>
-        </p:blipFill>
-        <p:spPr>
-          <a:xfrm>
-            <a:off x="3606084" y="4826318"/>
-            <a:ext cx="7585656" cy="1683952"/>
-          </a:xfrm>
-          <a:prstGeom prst="rect">
-            <a:avLst/>
-          </a:prstGeom>
-        </p:spPr>
-      </p:pic>
-    </p:spTree>
-    <p:extLst>
-      <p:ext uri="{BB962C8B-B14F-4D97-AF65-F5344CB8AC3E}">
-        <p14:creationId xmlns:p14="http://schemas.microsoft.com/office/powerpoint/2010/main" val="116525941"/>
       </p:ext>
     </p:extLst>
   </p:cSld>

</xml_diff>